<commit_message>
06 - Quarkus Configuration
</commit_message>
<xml_diff>
--- a/presentations/05_Quarkus_DatabaseAccess.pptx
+++ b/presentations/05_Quarkus_DatabaseAccess.pptx
@@ -6,46 +6,47 @@
   </p:sldMasterIdLst>
   <p:sldIdLst>
     <p:sldId id="256" r:id="rId2"/>
-    <p:sldId id="257" r:id="rId3"/>
-    <p:sldId id="258" r:id="rId4"/>
+    <p:sldId id="297" r:id="rId3"/>
+    <p:sldId id="257" r:id="rId4"/>
     <p:sldId id="262" r:id="rId5"/>
-    <p:sldId id="259" r:id="rId6"/>
-    <p:sldId id="260" r:id="rId7"/>
-    <p:sldId id="261" r:id="rId8"/>
-    <p:sldId id="263" r:id="rId9"/>
-    <p:sldId id="273" r:id="rId10"/>
-    <p:sldId id="264" r:id="rId11"/>
-    <p:sldId id="265" r:id="rId12"/>
-    <p:sldId id="266" r:id="rId13"/>
-    <p:sldId id="267" r:id="rId14"/>
-    <p:sldId id="270" r:id="rId15"/>
-    <p:sldId id="268" r:id="rId16"/>
-    <p:sldId id="269" r:id="rId17"/>
-    <p:sldId id="271" r:id="rId18"/>
-    <p:sldId id="272" r:id="rId19"/>
-    <p:sldId id="274" r:id="rId20"/>
-    <p:sldId id="275" r:id="rId21"/>
-    <p:sldId id="276" r:id="rId22"/>
-    <p:sldId id="277" r:id="rId23"/>
-    <p:sldId id="278" r:id="rId24"/>
-    <p:sldId id="279" r:id="rId25"/>
-    <p:sldId id="280" r:id="rId26"/>
-    <p:sldId id="281" r:id="rId27"/>
-    <p:sldId id="282" r:id="rId28"/>
-    <p:sldId id="283" r:id="rId29"/>
-    <p:sldId id="284" r:id="rId30"/>
-    <p:sldId id="285" r:id="rId31"/>
-    <p:sldId id="286" r:id="rId32"/>
-    <p:sldId id="287" r:id="rId33"/>
-    <p:sldId id="288" r:id="rId34"/>
-    <p:sldId id="289" r:id="rId35"/>
-    <p:sldId id="290" r:id="rId36"/>
-    <p:sldId id="291" r:id="rId37"/>
-    <p:sldId id="292" r:id="rId38"/>
-    <p:sldId id="294" r:id="rId39"/>
-    <p:sldId id="293" r:id="rId40"/>
-    <p:sldId id="295" r:id="rId41"/>
-    <p:sldId id="296" r:id="rId42"/>
+    <p:sldId id="258" r:id="rId6"/>
+    <p:sldId id="259" r:id="rId7"/>
+    <p:sldId id="260" r:id="rId8"/>
+    <p:sldId id="261" r:id="rId9"/>
+    <p:sldId id="263" r:id="rId10"/>
+    <p:sldId id="273" r:id="rId11"/>
+    <p:sldId id="264" r:id="rId12"/>
+    <p:sldId id="265" r:id="rId13"/>
+    <p:sldId id="266" r:id="rId14"/>
+    <p:sldId id="267" r:id="rId15"/>
+    <p:sldId id="270" r:id="rId16"/>
+    <p:sldId id="268" r:id="rId17"/>
+    <p:sldId id="269" r:id="rId18"/>
+    <p:sldId id="271" r:id="rId19"/>
+    <p:sldId id="272" r:id="rId20"/>
+    <p:sldId id="274" r:id="rId21"/>
+    <p:sldId id="275" r:id="rId22"/>
+    <p:sldId id="276" r:id="rId23"/>
+    <p:sldId id="277" r:id="rId24"/>
+    <p:sldId id="278" r:id="rId25"/>
+    <p:sldId id="279" r:id="rId26"/>
+    <p:sldId id="280" r:id="rId27"/>
+    <p:sldId id="281" r:id="rId28"/>
+    <p:sldId id="282" r:id="rId29"/>
+    <p:sldId id="283" r:id="rId30"/>
+    <p:sldId id="284" r:id="rId31"/>
+    <p:sldId id="285" r:id="rId32"/>
+    <p:sldId id="286" r:id="rId33"/>
+    <p:sldId id="287" r:id="rId34"/>
+    <p:sldId id="288" r:id="rId35"/>
+    <p:sldId id="289" r:id="rId36"/>
+    <p:sldId id="290" r:id="rId37"/>
+    <p:sldId id="291" r:id="rId38"/>
+    <p:sldId id="292" r:id="rId39"/>
+    <p:sldId id="294" r:id="rId40"/>
+    <p:sldId id="293" r:id="rId41"/>
+    <p:sldId id="295" r:id="rId42"/>
+    <p:sldId id="296" r:id="rId43"/>
   </p:sldIdLst>
   <p:sldSz cx="12192000" cy="6858000"/>
   <p:notesSz cx="6858000" cy="9144000"/>
@@ -144,6 +145,11 @@
       </a:defRPr>
     </a:lvl9pPr>
   </p:defaultTextStyle>
+  <p:extLst>
+    <p:ext uri="{EFAFB233-063F-42B5-8137-9DF3F51BA10A}">
+      <p15:sldGuideLst xmlns:p15="http://schemas.microsoft.com/office/powerpoint/2012/main"/>
+    </p:ext>
+  </p:extLst>
 </p:presentation>
 </file>
 
@@ -294,7 +300,7 @@
           <a:p>
             <a:fld id="{2AE2C332-9818-B14A-853C-2895E6C223E6}" type="datetimeFigureOut">
               <a:rPr lang="en-US" smtClean="0"/>
-              <a:t>3/31/23</a:t>
+              <a:t>4/2/23</a:t>
             </a:fld>
             <a:endParaRPr lang="en-US"/>
           </a:p>
@@ -492,7 +498,7 @@
           <a:p>
             <a:fld id="{2AE2C332-9818-B14A-853C-2895E6C223E6}" type="datetimeFigureOut">
               <a:rPr lang="en-US" smtClean="0"/>
-              <a:t>3/31/23</a:t>
+              <a:t>4/2/23</a:t>
             </a:fld>
             <a:endParaRPr lang="en-US"/>
           </a:p>
@@ -700,7 +706,7 @@
           <a:p>
             <a:fld id="{2AE2C332-9818-B14A-853C-2895E6C223E6}" type="datetimeFigureOut">
               <a:rPr lang="en-US" smtClean="0"/>
-              <a:t>3/31/23</a:t>
+              <a:t>4/2/23</a:t>
             </a:fld>
             <a:endParaRPr lang="en-US"/>
           </a:p>
@@ -898,7 +904,7 @@
           <a:p>
             <a:fld id="{2AE2C332-9818-B14A-853C-2895E6C223E6}" type="datetimeFigureOut">
               <a:rPr lang="en-US" smtClean="0"/>
-              <a:t>3/31/23</a:t>
+              <a:t>4/2/23</a:t>
             </a:fld>
             <a:endParaRPr lang="en-US"/>
           </a:p>
@@ -1173,7 +1179,7 @@
           <a:p>
             <a:fld id="{2AE2C332-9818-B14A-853C-2895E6C223E6}" type="datetimeFigureOut">
               <a:rPr lang="en-US" smtClean="0"/>
-              <a:t>3/31/23</a:t>
+              <a:t>4/2/23</a:t>
             </a:fld>
             <a:endParaRPr lang="en-US"/>
           </a:p>
@@ -1438,7 +1444,7 @@
           <a:p>
             <a:fld id="{2AE2C332-9818-B14A-853C-2895E6C223E6}" type="datetimeFigureOut">
               <a:rPr lang="en-US" smtClean="0"/>
-              <a:t>3/31/23</a:t>
+              <a:t>4/2/23</a:t>
             </a:fld>
             <a:endParaRPr lang="en-US"/>
           </a:p>
@@ -1850,7 +1856,7 @@
           <a:p>
             <a:fld id="{2AE2C332-9818-B14A-853C-2895E6C223E6}" type="datetimeFigureOut">
               <a:rPr lang="en-US" smtClean="0"/>
-              <a:t>3/31/23</a:t>
+              <a:t>4/2/23</a:t>
             </a:fld>
             <a:endParaRPr lang="en-US"/>
           </a:p>
@@ -1991,7 +1997,7 @@
           <a:p>
             <a:fld id="{2AE2C332-9818-B14A-853C-2895E6C223E6}" type="datetimeFigureOut">
               <a:rPr lang="en-US" smtClean="0"/>
-              <a:t>3/31/23</a:t>
+              <a:t>4/2/23</a:t>
             </a:fld>
             <a:endParaRPr lang="en-US"/>
           </a:p>
@@ -2104,7 +2110,7 @@
           <a:p>
             <a:fld id="{2AE2C332-9818-B14A-853C-2895E6C223E6}" type="datetimeFigureOut">
               <a:rPr lang="en-US" smtClean="0"/>
-              <a:t>3/31/23</a:t>
+              <a:t>4/2/23</a:t>
             </a:fld>
             <a:endParaRPr lang="en-US"/>
           </a:p>
@@ -2415,7 +2421,7 @@
           <a:p>
             <a:fld id="{2AE2C332-9818-B14A-853C-2895E6C223E6}" type="datetimeFigureOut">
               <a:rPr lang="en-US" smtClean="0"/>
-              <a:t>3/31/23</a:t>
+              <a:t>4/2/23</a:t>
             </a:fld>
             <a:endParaRPr lang="en-US"/>
           </a:p>
@@ -2703,7 +2709,7 @@
           <a:p>
             <a:fld id="{2AE2C332-9818-B14A-853C-2895E6C223E6}" type="datetimeFigureOut">
               <a:rPr lang="en-US" smtClean="0"/>
-              <a:t>3/31/23</a:t>
+              <a:t>4/2/23</a:t>
             </a:fld>
             <a:endParaRPr lang="en-US"/>
           </a:p>
@@ -2944,7 +2950,7 @@
           <a:p>
             <a:fld id="{2AE2C332-9818-B14A-853C-2895E6C223E6}" type="datetimeFigureOut">
               <a:rPr lang="en-US" smtClean="0"/>
-              <a:t>3/31/23</a:t>
+              <a:t>4/2/23</a:t>
             </a:fld>
             <a:endParaRPr lang="en-US"/>
           </a:p>
@@ -3449,10 +3455,10 @@
       </p:grpSpPr>
       <p:sp>
         <p:nvSpPr>
-          <p:cNvPr id="4" name="Title 3">
-            <a:extLst>
-              <a:ext uri="{FF2B5EF4-FFF2-40B4-BE49-F238E27FC236}">
-                <a16:creationId xmlns:a16="http://schemas.microsoft.com/office/drawing/2014/main" id="{D2D894F3-9258-7445-BCF6-5397CEF3BA86}"/>
+          <p:cNvPr id="2" name="Title 1">
+            <a:extLst>
+              <a:ext uri="{FF2B5EF4-FFF2-40B4-BE49-F238E27FC236}">
+                <a16:creationId xmlns:a16="http://schemas.microsoft.com/office/drawing/2014/main" id="{7AF6BA41-4354-DE44-820F-886611B13F2A}"/>
               </a:ext>
             </a:extLst>
           </p:cNvPr>
@@ -3470,17 +3476,17 @@
           <a:p>
             <a:r>
               <a:rPr lang="en-US" dirty="0"/>
-              <a:t>Introduction To Reactive SQL Clients</a:t>
-            </a:r>
-          </a:p>
-        </p:txBody>
-      </p:sp>
-      <p:sp>
-        <p:nvSpPr>
-          <p:cNvPr id="5" name="Content Placeholder 4">
-            <a:extLst>
-              <a:ext uri="{FF2B5EF4-FFF2-40B4-BE49-F238E27FC236}">
-                <a16:creationId xmlns:a16="http://schemas.microsoft.com/office/drawing/2014/main" id="{57F42712-0233-A849-9B62-C7D91D2B492C}"/>
+              <a:t>Agenda</a:t>
+            </a:r>
+          </a:p>
+        </p:txBody>
+      </p:sp>
+      <p:sp>
+        <p:nvSpPr>
+          <p:cNvPr id="3" name="Content Placeholder 2">
+            <a:extLst>
+              <a:ext uri="{FF2B5EF4-FFF2-40B4-BE49-F238E27FC236}">
+                <a16:creationId xmlns:a16="http://schemas.microsoft.com/office/drawing/2014/main" id="{F0290652-2C22-2744-9B94-94A613AB1001}"/>
               </a:ext>
             </a:extLst>
           </p:cNvPr>
@@ -3493,78 +3499,44 @@
         </p:nvSpPr>
         <p:spPr/>
         <p:txBody>
-          <a:bodyPr>
-            <a:normAutofit/>
-          </a:bodyPr>
-          <a:lstStyle/>
-          <a:p>
-            <a:r>
-              <a:rPr lang="en-US" dirty="0"/>
-              <a:t>Quarkus Reactive SQL Clients allow data access in a </a:t>
-            </a:r>
-            <a:r>
-              <a:rPr lang="en-US" i="1" dirty="0"/>
-              <a:t>non-blocking</a:t>
-            </a:r>
-            <a:r>
-              <a:rPr lang="en-US" dirty="0"/>
-              <a:t> manner thus increasing scalability and reducing overhead</a:t>
-            </a:r>
-          </a:p>
-          <a:p>
-            <a:endParaRPr lang="en-US" i="1" dirty="0"/>
-          </a:p>
-          <a:p>
-            <a:r>
-              <a:rPr lang="en-US" dirty="0"/>
-              <a:t>Currently following databases are supported for reactive access:</a:t>
-            </a:r>
-          </a:p>
-          <a:p>
-            <a:pPr lvl="1"/>
-            <a:r>
-              <a:rPr lang="en-IN" dirty="0"/>
-              <a:t>IBM Db2</a:t>
-            </a:r>
-          </a:p>
-          <a:p>
-            <a:pPr lvl="1"/>
-            <a:r>
-              <a:rPr lang="en-IN" dirty="0"/>
-              <a:t>PostgreSQL</a:t>
-            </a:r>
-          </a:p>
-          <a:p>
-            <a:pPr lvl="1"/>
-            <a:r>
-              <a:rPr lang="en-IN" dirty="0"/>
-              <a:t>MariaDB/MySQL</a:t>
-            </a:r>
-          </a:p>
-          <a:p>
-            <a:pPr lvl="1"/>
-            <a:r>
-              <a:rPr lang="en-IN" dirty="0"/>
-              <a:t>Microsoft SQL Server</a:t>
-            </a:r>
-          </a:p>
-          <a:p>
-            <a:pPr lvl="1"/>
-            <a:r>
-              <a:rPr lang="en-IN" dirty="0"/>
-              <a:t>Oracle</a:t>
-            </a:r>
-          </a:p>
-          <a:p>
-            <a:pPr lvl="1"/>
-            <a:endParaRPr lang="en-US" dirty="0"/>
+          <a:bodyPr/>
+          <a:lstStyle/>
+          <a:p>
+            <a:r>
+              <a:rPr lang="en-US" dirty="0"/>
+              <a:t>Introduction to reactive SQL client</a:t>
+            </a:r>
+          </a:p>
+          <a:p>
+            <a:r>
+              <a:rPr lang="en-US" dirty="0"/>
+              <a:t>Reactive SQL Client Extensions</a:t>
+            </a:r>
+          </a:p>
+          <a:p>
+            <a:r>
+              <a:rPr lang="en-US" dirty="0"/>
+              <a:t>Configuring Reactive Datasource</a:t>
+            </a:r>
+          </a:p>
+          <a:p>
+            <a:r>
+              <a:rPr lang="en-US" dirty="0"/>
+              <a:t>Reading &amp; Writing Data – Reactive way</a:t>
+            </a:r>
+          </a:p>
+          <a:p>
+            <a:r>
+              <a:rPr lang="en-US" dirty="0"/>
+              <a:t>Handling Transactions </a:t>
+            </a:r>
           </a:p>
         </p:txBody>
       </p:sp>
     </p:spTree>
     <p:extLst>
       <p:ext uri="{BB962C8B-B14F-4D97-AF65-F5344CB8AC3E}">
-        <p14:creationId xmlns:p14="http://schemas.microsoft.com/office/powerpoint/2010/main" val="3559450840"/>
+        <p14:creationId xmlns:p14="http://schemas.microsoft.com/office/powerpoint/2010/main" val="782637085"/>
       </p:ext>
     </p:extLst>
   </p:cSld>
@@ -3593,10 +3565,10 @@
       </p:grpSpPr>
       <p:sp>
         <p:nvSpPr>
-          <p:cNvPr id="2" name="Title 1">
-            <a:extLst>
-              <a:ext uri="{FF2B5EF4-FFF2-40B4-BE49-F238E27FC236}">
-                <a16:creationId xmlns:a16="http://schemas.microsoft.com/office/drawing/2014/main" id="{FD66E1F8-2483-4248-8D3B-556D4D9B67BE}"/>
+          <p:cNvPr id="4" name="Title 3">
+            <a:extLst>
+              <a:ext uri="{FF2B5EF4-FFF2-40B4-BE49-F238E27FC236}">
+                <a16:creationId xmlns:a16="http://schemas.microsoft.com/office/drawing/2014/main" id="{D2D894F3-9258-7445-BCF6-5397CEF3BA86}"/>
               </a:ext>
             </a:extLst>
           </p:cNvPr>
@@ -3614,128 +3586,93 @@
           <a:p>
             <a:r>
               <a:rPr lang="en-US" dirty="0"/>
-              <a:t>Reactive SQL Client Extensions</a:t>
-            </a:r>
-          </a:p>
-        </p:txBody>
-      </p:sp>
-      <p:pic>
-        <p:nvPicPr>
-          <p:cNvPr id="4" name="Content Placeholder 3">
-            <a:extLst>
-              <a:ext uri="{FF2B5EF4-FFF2-40B4-BE49-F238E27FC236}">
-                <a16:creationId xmlns:a16="http://schemas.microsoft.com/office/drawing/2014/main" id="{CD615470-4216-D442-99B0-5B9A515B20A6}"/>
-              </a:ext>
-            </a:extLst>
-          </p:cNvPr>
-          <p:cNvPicPr>
-            <a:picLocks noGrp="1" noChangeAspect="1"/>
-          </p:cNvPicPr>
+              <a:t>Introduction To Reactive SQL Clients</a:t>
+            </a:r>
+          </a:p>
+        </p:txBody>
+      </p:sp>
+      <p:sp>
+        <p:nvSpPr>
+          <p:cNvPr id="5" name="Content Placeholder 4">
+            <a:extLst>
+              <a:ext uri="{FF2B5EF4-FFF2-40B4-BE49-F238E27FC236}">
+                <a16:creationId xmlns:a16="http://schemas.microsoft.com/office/drawing/2014/main" id="{57F42712-0233-A849-9B62-C7D91D2B492C}"/>
+              </a:ext>
+            </a:extLst>
+          </p:cNvPr>
+          <p:cNvSpPr>
+            <a:spLocks noGrp="1"/>
+          </p:cNvSpPr>
           <p:nvPr>
             <p:ph idx="1"/>
           </p:nvPr>
-        </p:nvPicPr>
-        <p:blipFill>
-          <a:blip r:embed="rId2"/>
-          <a:stretch>
-            <a:fillRect/>
-          </a:stretch>
-        </p:blipFill>
-        <p:spPr>
-          <a:xfrm>
-            <a:off x="4845113" y="1690688"/>
-            <a:ext cx="6591814" cy="4351338"/>
-          </a:xfrm>
-          <a:prstGeom prst="rect">
-            <a:avLst/>
-          </a:prstGeom>
-        </p:spPr>
-      </p:pic>
-      <p:sp>
-        <p:nvSpPr>
-          <p:cNvPr id="5" name="TextBox 4">
-            <a:extLst>
-              <a:ext uri="{FF2B5EF4-FFF2-40B4-BE49-F238E27FC236}">
-                <a16:creationId xmlns:a16="http://schemas.microsoft.com/office/drawing/2014/main" id="{794B36E8-F258-F842-8167-5179EA342CE2}"/>
-              </a:ext>
-            </a:extLst>
-          </p:cNvPr>
-          <p:cNvSpPr txBox="1"/>
-          <p:nvPr/>
-        </p:nvSpPr>
-        <p:spPr>
-          <a:xfrm>
-            <a:off x="838200" y="1690688"/>
-            <a:ext cx="3555670" cy="2308324"/>
-          </a:xfrm>
-          <a:prstGeom prst="rect">
-            <a:avLst/>
-          </a:prstGeom>
-          <a:noFill/>
-        </p:spPr>
-        <p:txBody>
-          <a:bodyPr wrap="square" rtlCol="0">
-            <a:spAutoFit/>
+        </p:nvSpPr>
+        <p:spPr/>
+        <p:txBody>
+          <a:bodyPr>
+            <a:normAutofit/>
           </a:bodyPr>
           <a:lstStyle/>
           <a:p>
-            <a:pPr marL="285750" indent="-285750">
-              <a:buFont typeface="Arial" panose="020B0604020202020204" pitchFamily="34" charset="0"/>
-              <a:buChar char="•"/>
-            </a:pPr>
-            <a:r>
-              <a:rPr lang="en-US" dirty="0"/>
-              <a:t>Select database specific reactive SQL client extension while creating the application</a:t>
-            </a:r>
-          </a:p>
-          <a:p>
-            <a:pPr marL="285750" indent="-285750">
-              <a:buFont typeface="Arial" panose="020B0604020202020204" pitchFamily="34" charset="0"/>
-              <a:buChar char="•"/>
-            </a:pPr>
-            <a:endParaRPr lang="en-US" dirty="0"/>
-          </a:p>
-          <a:p>
-            <a:pPr marL="285750" indent="-285750">
-              <a:buFont typeface="Arial" panose="020B0604020202020204" pitchFamily="34" charset="0"/>
-              <a:buChar char="•"/>
-            </a:pPr>
-            <a:r>
-              <a:rPr lang="en-US" dirty="0"/>
-              <a:t>Add additional extensions for REST API:</a:t>
-            </a:r>
-          </a:p>
-          <a:p>
-            <a:pPr marL="742950" lvl="1" indent="-285750">
-              <a:buFont typeface="Arial" panose="020B0604020202020204" pitchFamily="34" charset="0"/>
-              <a:buChar char="•"/>
-            </a:pPr>
-            <a:r>
-              <a:rPr lang="en-US" dirty="0" err="1"/>
-              <a:t>restEasy</a:t>
-            </a:r>
-            <a:r>
-              <a:rPr lang="en-US" dirty="0"/>
-              <a:t>-reactive</a:t>
-            </a:r>
-          </a:p>
-          <a:p>
-            <a:pPr marL="742950" lvl="1" indent="-285750">
-              <a:buFont typeface="Arial" panose="020B0604020202020204" pitchFamily="34" charset="0"/>
-              <a:buChar char="•"/>
-            </a:pPr>
-            <a:r>
-              <a:rPr lang="en-US" dirty="0" err="1"/>
-              <a:t>restEast</a:t>
-            </a:r>
-            <a:r>
-              <a:rPr lang="en-US" dirty="0"/>
-              <a:t>-reactive-</a:t>
-            </a:r>
-            <a:r>
-              <a:rPr lang="en-US" dirty="0" err="1"/>
-              <a:t>jackson</a:t>
-            </a:r>
+            <a:r>
+              <a:rPr lang="en-US" dirty="0"/>
+              <a:t>Quarkus Reactive SQL Clients allow data access in a </a:t>
+            </a:r>
+            <a:r>
+              <a:rPr lang="en-US" i="1" dirty="0"/>
+              <a:t>non-blocking</a:t>
+            </a:r>
+            <a:r>
+              <a:rPr lang="en-US" dirty="0"/>
+              <a:t> manner thus increasing scalability and reducing overhead</a:t>
+            </a:r>
+          </a:p>
+          <a:p>
+            <a:endParaRPr lang="en-US" i="1" dirty="0"/>
+          </a:p>
+          <a:p>
+            <a:r>
+              <a:rPr lang="en-US" dirty="0"/>
+              <a:t>Currently following databases are supported for reactive access:</a:t>
+            </a:r>
+          </a:p>
+          <a:p>
+            <a:pPr lvl="1"/>
+            <a:r>
+              <a:rPr lang="en-IN" dirty="0"/>
+              <a:t>IBM Db2</a:t>
+            </a:r>
+          </a:p>
+          <a:p>
+            <a:pPr lvl="1"/>
+            <a:r>
+              <a:rPr lang="en-IN" dirty="0"/>
+              <a:t>PostgreSQL</a:t>
+            </a:r>
+          </a:p>
+          <a:p>
+            <a:pPr lvl="1"/>
+            <a:r>
+              <a:rPr lang="en-IN" dirty="0"/>
+              <a:t>MariaDB/MySQL</a:t>
+            </a:r>
+          </a:p>
+          <a:p>
+            <a:pPr lvl="1"/>
+            <a:r>
+              <a:rPr lang="en-IN" dirty="0"/>
+              <a:t>Microsoft SQL Server</a:t>
+            </a:r>
+          </a:p>
+          <a:p>
+            <a:pPr lvl="1"/>
+            <a:r>
+              <a:rPr lang="en-IN" dirty="0"/>
+              <a:t>Oracle</a:t>
+            </a:r>
+          </a:p>
+          <a:p>
+            <a:pPr lvl="1"/>
             <a:endParaRPr lang="en-US" dirty="0"/>
           </a:p>
         </p:txBody>
@@ -3743,7 +3680,7 @@
     </p:spTree>
     <p:extLst>
       <p:ext uri="{BB962C8B-B14F-4D97-AF65-F5344CB8AC3E}">
-        <p14:creationId xmlns:p14="http://schemas.microsoft.com/office/powerpoint/2010/main" val="3790317856"/>
+        <p14:creationId xmlns:p14="http://schemas.microsoft.com/office/powerpoint/2010/main" val="3559450840"/>
       </p:ext>
     </p:extLst>
   </p:cSld>
@@ -3775,6 +3712,185 @@
           <p:cNvPr id="2" name="Title 1">
             <a:extLst>
               <a:ext uri="{FF2B5EF4-FFF2-40B4-BE49-F238E27FC236}">
+                <a16:creationId xmlns:a16="http://schemas.microsoft.com/office/drawing/2014/main" id="{FD66E1F8-2483-4248-8D3B-556D4D9B67BE}"/>
+              </a:ext>
+            </a:extLst>
+          </p:cNvPr>
+          <p:cNvSpPr>
+            <a:spLocks noGrp="1"/>
+          </p:cNvSpPr>
+          <p:nvPr>
+            <p:ph type="title"/>
+          </p:nvPr>
+        </p:nvSpPr>
+        <p:spPr/>
+        <p:txBody>
+          <a:bodyPr/>
+          <a:lstStyle/>
+          <a:p>
+            <a:r>
+              <a:rPr lang="en-US" dirty="0"/>
+              <a:t>Reactive SQL Client Extensions</a:t>
+            </a:r>
+          </a:p>
+        </p:txBody>
+      </p:sp>
+      <p:pic>
+        <p:nvPicPr>
+          <p:cNvPr id="4" name="Content Placeholder 3">
+            <a:extLst>
+              <a:ext uri="{FF2B5EF4-FFF2-40B4-BE49-F238E27FC236}">
+                <a16:creationId xmlns:a16="http://schemas.microsoft.com/office/drawing/2014/main" id="{CD615470-4216-D442-99B0-5B9A515B20A6}"/>
+              </a:ext>
+            </a:extLst>
+          </p:cNvPr>
+          <p:cNvPicPr>
+            <a:picLocks noGrp="1" noChangeAspect="1"/>
+          </p:cNvPicPr>
+          <p:nvPr>
+            <p:ph idx="1"/>
+          </p:nvPr>
+        </p:nvPicPr>
+        <p:blipFill>
+          <a:blip r:embed="rId2"/>
+          <a:stretch>
+            <a:fillRect/>
+          </a:stretch>
+        </p:blipFill>
+        <p:spPr>
+          <a:xfrm>
+            <a:off x="4845113" y="1690688"/>
+            <a:ext cx="6591814" cy="4351338"/>
+          </a:xfrm>
+          <a:prstGeom prst="rect">
+            <a:avLst/>
+          </a:prstGeom>
+        </p:spPr>
+      </p:pic>
+      <p:sp>
+        <p:nvSpPr>
+          <p:cNvPr id="5" name="TextBox 4">
+            <a:extLst>
+              <a:ext uri="{FF2B5EF4-FFF2-40B4-BE49-F238E27FC236}">
+                <a16:creationId xmlns:a16="http://schemas.microsoft.com/office/drawing/2014/main" id="{794B36E8-F258-F842-8167-5179EA342CE2}"/>
+              </a:ext>
+            </a:extLst>
+          </p:cNvPr>
+          <p:cNvSpPr txBox="1"/>
+          <p:nvPr/>
+        </p:nvSpPr>
+        <p:spPr>
+          <a:xfrm>
+            <a:off x="838200" y="1690688"/>
+            <a:ext cx="3555670" cy="2308324"/>
+          </a:xfrm>
+          <a:prstGeom prst="rect">
+            <a:avLst/>
+          </a:prstGeom>
+          <a:noFill/>
+        </p:spPr>
+        <p:txBody>
+          <a:bodyPr wrap="square" rtlCol="0">
+            <a:spAutoFit/>
+          </a:bodyPr>
+          <a:lstStyle/>
+          <a:p>
+            <a:pPr marL="285750" indent="-285750">
+              <a:buFont typeface="Arial" panose="020B0604020202020204" pitchFamily="34" charset="0"/>
+              <a:buChar char="•"/>
+            </a:pPr>
+            <a:r>
+              <a:rPr lang="en-US" dirty="0"/>
+              <a:t>Select database specific reactive SQL client extension while creating the application</a:t>
+            </a:r>
+          </a:p>
+          <a:p>
+            <a:pPr marL="285750" indent="-285750">
+              <a:buFont typeface="Arial" panose="020B0604020202020204" pitchFamily="34" charset="0"/>
+              <a:buChar char="•"/>
+            </a:pPr>
+            <a:endParaRPr lang="en-US" dirty="0"/>
+          </a:p>
+          <a:p>
+            <a:pPr marL="285750" indent="-285750">
+              <a:buFont typeface="Arial" panose="020B0604020202020204" pitchFamily="34" charset="0"/>
+              <a:buChar char="•"/>
+            </a:pPr>
+            <a:r>
+              <a:rPr lang="en-US" dirty="0"/>
+              <a:t>Add additional extensions for REST API:</a:t>
+            </a:r>
+          </a:p>
+          <a:p>
+            <a:pPr marL="742950" lvl="1" indent="-285750">
+              <a:buFont typeface="Arial" panose="020B0604020202020204" pitchFamily="34" charset="0"/>
+              <a:buChar char="•"/>
+            </a:pPr>
+            <a:r>
+              <a:rPr lang="en-US" dirty="0" err="1"/>
+              <a:t>restEasy</a:t>
+            </a:r>
+            <a:r>
+              <a:rPr lang="en-US" dirty="0"/>
+              <a:t>-reactive</a:t>
+            </a:r>
+          </a:p>
+          <a:p>
+            <a:pPr marL="742950" lvl="1" indent="-285750">
+              <a:buFont typeface="Arial" panose="020B0604020202020204" pitchFamily="34" charset="0"/>
+              <a:buChar char="•"/>
+            </a:pPr>
+            <a:r>
+              <a:rPr lang="en-US" dirty="0" err="1"/>
+              <a:t>restEast</a:t>
+            </a:r>
+            <a:r>
+              <a:rPr lang="en-US" dirty="0"/>
+              <a:t>-reactive-</a:t>
+            </a:r>
+            <a:r>
+              <a:rPr lang="en-US" dirty="0" err="1"/>
+              <a:t>jackson</a:t>
+            </a:r>
+            <a:endParaRPr lang="en-US" dirty="0"/>
+          </a:p>
+        </p:txBody>
+      </p:sp>
+    </p:spTree>
+    <p:extLst>
+      <p:ext uri="{BB962C8B-B14F-4D97-AF65-F5344CB8AC3E}">
+        <p14:creationId xmlns:p14="http://schemas.microsoft.com/office/powerpoint/2010/main" val="3790317856"/>
+      </p:ext>
+    </p:extLst>
+  </p:cSld>
+  <p:clrMapOvr>
+    <a:masterClrMapping/>
+  </p:clrMapOvr>
+</p:sld>
+</file>
+
+<file path=ppt/slides/slide13.xml><?xml version="1.0" encoding="utf-8"?>
+<p:sld xmlns:a="http://schemas.openxmlformats.org/drawingml/2006/main" xmlns:r="http://schemas.openxmlformats.org/officeDocument/2006/relationships" xmlns:p="http://schemas.openxmlformats.org/presentationml/2006/main">
+  <p:cSld>
+    <p:spTree>
+      <p:nvGrpSpPr>
+        <p:cNvPr id="1" name=""/>
+        <p:cNvGrpSpPr/>
+        <p:nvPr/>
+      </p:nvGrpSpPr>
+      <p:grpSpPr>
+        <a:xfrm>
+          <a:off x="0" y="0"/>
+          <a:ext cx="0" cy="0"/>
+          <a:chOff x="0" y="0"/>
+          <a:chExt cx="0" cy="0"/>
+        </a:xfrm>
+      </p:grpSpPr>
+      <p:sp>
+        <p:nvSpPr>
+          <p:cNvPr id="2" name="Title 1">
+            <a:extLst>
+              <a:ext uri="{FF2B5EF4-FFF2-40B4-BE49-F238E27FC236}">
                 <a16:creationId xmlns:a16="http://schemas.microsoft.com/office/drawing/2014/main" id="{B02A9D1F-3361-EB4A-89F0-78EDE82198B2}"/>
               </a:ext>
             </a:extLst>
@@ -3905,7 +4021,7 @@
 </p:sld>
 </file>
 
-<file path=ppt/slides/slide13.xml><?xml version="1.0" encoding="utf-8"?>
+<file path=ppt/slides/slide14.xml><?xml version="1.0" encoding="utf-8"?>
 <p:sld xmlns:a="http://schemas.openxmlformats.org/drawingml/2006/main" xmlns:r="http://schemas.openxmlformats.org/officeDocument/2006/relationships" xmlns:p="http://schemas.openxmlformats.org/presentationml/2006/main">
   <p:cSld>
     <p:spTree>
@@ -3993,7 +4109,7 @@
 </p:sld>
 </file>
 
-<file path=ppt/slides/slide14.xml><?xml version="1.0" encoding="utf-8"?>
+<file path=ppt/slides/slide15.xml><?xml version="1.0" encoding="utf-8"?>
 <p:sld xmlns:a="http://schemas.openxmlformats.org/drawingml/2006/main" xmlns:r="http://schemas.openxmlformats.org/officeDocument/2006/relationships" xmlns:p="http://schemas.openxmlformats.org/presentationml/2006/main">
   <p:cSld>
     <p:spTree>
@@ -4200,7 +4316,7 @@
 </p:sld>
 </file>
 
-<file path=ppt/slides/slide15.xml><?xml version="1.0" encoding="utf-8"?>
+<file path=ppt/slides/slide16.xml><?xml version="1.0" encoding="utf-8"?>
 <p:sld xmlns:a="http://schemas.openxmlformats.org/drawingml/2006/main" xmlns:r="http://schemas.openxmlformats.org/officeDocument/2006/relationships" xmlns:p="http://schemas.openxmlformats.org/presentationml/2006/main">
   <p:cSld>
     <p:spTree>
@@ -4398,7 +4514,7 @@
 </p:sld>
 </file>
 
-<file path=ppt/slides/slide16.xml><?xml version="1.0" encoding="utf-8"?>
+<file path=ppt/slides/slide17.xml><?xml version="1.0" encoding="utf-8"?>
 <p:sld xmlns:a="http://schemas.openxmlformats.org/drawingml/2006/main" xmlns:r="http://schemas.openxmlformats.org/officeDocument/2006/relationships" xmlns:p="http://schemas.openxmlformats.org/presentationml/2006/main">
   <p:cSld>
     <p:spTree>
@@ -4607,7 +4723,7 @@
 </p:sld>
 </file>
 
-<file path=ppt/slides/slide17.xml><?xml version="1.0" encoding="utf-8"?>
+<file path=ppt/slides/slide18.xml><?xml version="1.0" encoding="utf-8"?>
 <p:sld xmlns:a="http://schemas.openxmlformats.org/drawingml/2006/main" xmlns:r="http://schemas.openxmlformats.org/officeDocument/2006/relationships" xmlns:p="http://schemas.openxmlformats.org/presentationml/2006/main">
   <p:cSld>
     <p:spTree>
@@ -4762,69 +4878,6 @@
 </p:sld>
 </file>
 
-<file path=ppt/slides/slide18.xml><?xml version="1.0" encoding="utf-8"?>
-<p:sld xmlns:a="http://schemas.openxmlformats.org/drawingml/2006/main" xmlns:r="http://schemas.openxmlformats.org/officeDocument/2006/relationships" xmlns:p="http://schemas.openxmlformats.org/presentationml/2006/main">
-  <p:cSld>
-    <p:spTree>
-      <p:nvGrpSpPr>
-        <p:cNvPr id="1" name=""/>
-        <p:cNvGrpSpPr/>
-        <p:nvPr/>
-      </p:nvGrpSpPr>
-      <p:grpSpPr>
-        <a:xfrm>
-          <a:off x="0" y="0"/>
-          <a:ext cx="0" cy="0"/>
-          <a:chOff x="0" y="0"/>
-          <a:chExt cx="0" cy="0"/>
-        </a:xfrm>
-      </p:grpSpPr>
-      <p:sp>
-        <p:nvSpPr>
-          <p:cNvPr id="3" name="Content Placeholder 2">
-            <a:extLst>
-              <a:ext uri="{FF2B5EF4-FFF2-40B4-BE49-F238E27FC236}">
-                <a16:creationId xmlns:a16="http://schemas.microsoft.com/office/drawing/2014/main" id="{6953598C-B006-A742-992D-4467BFEF7FF2}"/>
-              </a:ext>
-            </a:extLst>
-          </p:cNvPr>
-          <p:cNvSpPr>
-            <a:spLocks noGrp="1"/>
-          </p:cNvSpPr>
-          <p:nvPr>
-            <p:ph idx="1"/>
-          </p:nvPr>
-        </p:nvSpPr>
-        <p:spPr/>
-        <p:txBody>
-          <a:bodyPr>
-            <a:normAutofit/>
-          </a:bodyPr>
-          <a:lstStyle/>
-          <a:p>
-            <a:pPr marL="0" indent="0">
-              <a:buNone/>
-            </a:pPr>
-            <a:r>
-              <a:rPr lang="en-US" sz="4000" dirty="0"/>
-              <a:t>End</a:t>
-            </a:r>
-          </a:p>
-        </p:txBody>
-      </p:sp>
-    </p:spTree>
-    <p:extLst>
-      <p:ext uri="{BB962C8B-B14F-4D97-AF65-F5344CB8AC3E}">
-        <p14:creationId xmlns:p14="http://schemas.microsoft.com/office/powerpoint/2010/main" val="143472377"/>
-      </p:ext>
-    </p:extLst>
-  </p:cSld>
-  <p:clrMapOvr>
-    <a:masterClrMapping/>
-  </p:clrMapOvr>
-</p:sld>
-</file>
-
 <file path=ppt/slides/slide19.xml><?xml version="1.0" encoding="utf-8"?>
 <p:sld xmlns:a="http://schemas.openxmlformats.org/drawingml/2006/main" xmlns:r="http://schemas.openxmlformats.org/officeDocument/2006/relationships" xmlns:p="http://schemas.openxmlformats.org/presentationml/2006/main">
   <p:cSld>
@@ -4844,56 +4897,33 @@
       </p:grpSpPr>
       <p:sp>
         <p:nvSpPr>
-          <p:cNvPr id="4" name="Title 3">
-            <a:extLst>
-              <a:ext uri="{FF2B5EF4-FFF2-40B4-BE49-F238E27FC236}">
-                <a16:creationId xmlns:a16="http://schemas.microsoft.com/office/drawing/2014/main" id="{4E457768-81DE-7140-81B5-0AB89CCA9E60}"/>
-              </a:ext>
-            </a:extLst>
-          </p:cNvPr>
-          <p:cNvSpPr>
-            <a:spLocks noGrp="1"/>
-          </p:cNvSpPr>
-          <p:nvPr>
-            <p:ph type="title"/>
-          </p:nvPr>
-        </p:nvSpPr>
-        <p:spPr/>
-        <p:txBody>
-          <a:bodyPr/>
-          <a:lstStyle/>
-          <a:p>
-            <a:r>
-              <a:rPr lang="en-US" dirty="0"/>
-              <a:t>Part 3</a:t>
-            </a:r>
-          </a:p>
-        </p:txBody>
-      </p:sp>
-      <p:sp>
-        <p:nvSpPr>
-          <p:cNvPr id="5" name="Text Placeholder 4">
-            <a:extLst>
-              <a:ext uri="{FF2B5EF4-FFF2-40B4-BE49-F238E27FC236}">
-                <a16:creationId xmlns:a16="http://schemas.microsoft.com/office/drawing/2014/main" id="{6A5C0139-442F-0248-8D78-CBA48E89F2BC}"/>
-              </a:ext>
-            </a:extLst>
-          </p:cNvPr>
-          <p:cNvSpPr>
-            <a:spLocks noGrp="1"/>
-          </p:cNvSpPr>
-          <p:nvPr>
-            <p:ph type="body" idx="1"/>
-          </p:nvPr>
-        </p:nvSpPr>
-        <p:spPr/>
-        <p:txBody>
-          <a:bodyPr/>
-          <a:lstStyle/>
-          <a:p>
-            <a:r>
-              <a:rPr lang="en-US" dirty="0"/>
-              <a:t>Data Access using Hibernate ORM with Panache &amp; H2 Database</a:t>
+          <p:cNvPr id="3" name="Content Placeholder 2">
+            <a:extLst>
+              <a:ext uri="{FF2B5EF4-FFF2-40B4-BE49-F238E27FC236}">
+                <a16:creationId xmlns:a16="http://schemas.microsoft.com/office/drawing/2014/main" id="{6953598C-B006-A742-992D-4467BFEF7FF2}"/>
+              </a:ext>
+            </a:extLst>
+          </p:cNvPr>
+          <p:cNvSpPr>
+            <a:spLocks noGrp="1"/>
+          </p:cNvSpPr>
+          <p:nvPr>
+            <p:ph idx="1"/>
+          </p:nvPr>
+        </p:nvSpPr>
+        <p:spPr/>
+        <p:txBody>
+          <a:bodyPr>
+            <a:normAutofit/>
+          </a:bodyPr>
+          <a:lstStyle/>
+          <a:p>
+            <a:pPr marL="0" indent="0">
+              <a:buNone/>
+            </a:pPr>
+            <a:r>
+              <a:rPr lang="en-US" sz="4000" dirty="0"/>
+              <a:t>End</a:t>
             </a:r>
           </a:p>
         </p:txBody>
@@ -4901,7 +4931,7 @@
     </p:spTree>
     <p:extLst>
       <p:ext uri="{BB962C8B-B14F-4D97-AF65-F5344CB8AC3E}">
-        <p14:creationId xmlns:p14="http://schemas.microsoft.com/office/powerpoint/2010/main" val="490336528"/>
+        <p14:creationId xmlns:p14="http://schemas.microsoft.com/office/powerpoint/2010/main" val="143472377"/>
       </p:ext>
     </p:extLst>
   </p:cSld>
@@ -4930,10 +4960,10 @@
       </p:grpSpPr>
       <p:sp>
         <p:nvSpPr>
-          <p:cNvPr id="4" name="Title 3">
-            <a:extLst>
-              <a:ext uri="{FF2B5EF4-FFF2-40B4-BE49-F238E27FC236}">
-                <a16:creationId xmlns:a16="http://schemas.microsoft.com/office/drawing/2014/main" id="{9C06D9B5-A2AB-B443-8785-242FE8223C3E}"/>
+          <p:cNvPr id="2" name="Title 1">
+            <a:extLst>
+              <a:ext uri="{FF2B5EF4-FFF2-40B4-BE49-F238E27FC236}">
+                <a16:creationId xmlns:a16="http://schemas.microsoft.com/office/drawing/2014/main" id="{02F10962-FDCE-004B-A805-205BEF535DEF}"/>
               </a:ext>
             </a:extLst>
           </p:cNvPr>
@@ -4951,35 +4981,59 @@
           <a:p>
             <a:r>
               <a:rPr lang="en-US" dirty="0"/>
-              <a:t>Part 1</a:t>
-            </a:r>
-          </a:p>
-        </p:txBody>
-      </p:sp>
-      <p:sp>
-        <p:nvSpPr>
-          <p:cNvPr id="5" name="Subtitle 4">
-            <a:extLst>
-              <a:ext uri="{FF2B5EF4-FFF2-40B4-BE49-F238E27FC236}">
-                <a16:creationId xmlns:a16="http://schemas.microsoft.com/office/drawing/2014/main" id="{3558F535-CCCB-A641-BAE3-158E1E8CB17A}"/>
-              </a:ext>
-            </a:extLst>
-          </p:cNvPr>
-          <p:cNvSpPr>
-            <a:spLocks noGrp="1"/>
-          </p:cNvSpPr>
-          <p:nvPr>
-            <p:ph type="body" idx="1"/>
-          </p:nvPr>
-        </p:nvSpPr>
-        <p:spPr/>
-        <p:txBody>
-          <a:bodyPr/>
-          <a:lstStyle/>
-          <a:p>
-            <a:r>
-              <a:rPr lang="en-US" dirty="0"/>
-              <a:t>Introduction to Database Support &amp; Sample Application </a:t>
+              <a:t>Topics</a:t>
+            </a:r>
+          </a:p>
+        </p:txBody>
+      </p:sp>
+      <p:sp>
+        <p:nvSpPr>
+          <p:cNvPr id="3" name="Content Placeholder 2">
+            <a:extLst>
+              <a:ext uri="{FF2B5EF4-FFF2-40B4-BE49-F238E27FC236}">
+                <a16:creationId xmlns:a16="http://schemas.microsoft.com/office/drawing/2014/main" id="{DFC6FC27-D35D-494B-BFBC-667E204636BA}"/>
+              </a:ext>
+            </a:extLst>
+          </p:cNvPr>
+          <p:cNvSpPr>
+            <a:spLocks noGrp="1"/>
+          </p:cNvSpPr>
+          <p:nvPr>
+            <p:ph idx="1"/>
+          </p:nvPr>
+        </p:nvSpPr>
+        <p:spPr/>
+        <p:txBody>
+          <a:bodyPr/>
+          <a:lstStyle/>
+          <a:p>
+            <a:r>
+              <a:rPr lang="en-US" dirty="0"/>
+              <a:t>Introduction Database Access Support in Quarkus</a:t>
+            </a:r>
+          </a:p>
+          <a:p>
+            <a:r>
+              <a:rPr lang="en-US" dirty="0"/>
+              <a:t>Data Access using Reactive SQL Client</a:t>
+            </a:r>
+          </a:p>
+          <a:p>
+            <a:r>
+              <a:rPr lang="en-US" dirty="0"/>
+              <a:t>Data Access using Hibernate ORM with Panache</a:t>
+            </a:r>
+          </a:p>
+          <a:p>
+            <a:r>
+              <a:rPr lang="en-US" dirty="0"/>
+              <a:t>Zero Config H2 and MySql Database using Dev Services</a:t>
+            </a:r>
+          </a:p>
+          <a:p>
+            <a:r>
+              <a:rPr lang="en-US" dirty="0"/>
+              <a:t>Unit Testing Database Access</a:t>
             </a:r>
           </a:p>
         </p:txBody>
@@ -4987,7 +5041,7 @@
     </p:spTree>
     <p:extLst>
       <p:ext uri="{BB962C8B-B14F-4D97-AF65-F5344CB8AC3E}">
-        <p14:creationId xmlns:p14="http://schemas.microsoft.com/office/powerpoint/2010/main" val="1499578661"/>
+        <p14:creationId xmlns:p14="http://schemas.microsoft.com/office/powerpoint/2010/main" val="481399509"/>
       </p:ext>
     </p:extLst>
   </p:cSld>
@@ -5019,7 +5073,7 @@
           <p:cNvPr id="4" name="Title 3">
             <a:extLst>
               <a:ext uri="{FF2B5EF4-FFF2-40B4-BE49-F238E27FC236}">
-                <a16:creationId xmlns:a16="http://schemas.microsoft.com/office/drawing/2014/main" id="{65247FB2-75C9-0142-8A6A-406C101A9DEC}"/>
+                <a16:creationId xmlns:a16="http://schemas.microsoft.com/office/drawing/2014/main" id="{4E457768-81DE-7140-81B5-0AB89CCA9E60}"/>
               </a:ext>
             </a:extLst>
           </p:cNvPr>
@@ -5037,71 +5091,35 @@
           <a:p>
             <a:r>
               <a:rPr lang="en-US" dirty="0"/>
-              <a:t>Agenda</a:t>
-            </a:r>
-          </a:p>
-        </p:txBody>
-      </p:sp>
-      <p:sp>
-        <p:nvSpPr>
-          <p:cNvPr id="5" name="Content Placeholder 4">
-            <a:extLst>
-              <a:ext uri="{FF2B5EF4-FFF2-40B4-BE49-F238E27FC236}">
-                <a16:creationId xmlns:a16="http://schemas.microsoft.com/office/drawing/2014/main" id="{6919ECD4-9677-5345-84C0-4113AF29FA6C}"/>
-              </a:ext>
-            </a:extLst>
-          </p:cNvPr>
-          <p:cNvSpPr>
-            <a:spLocks noGrp="1"/>
-          </p:cNvSpPr>
-          <p:nvPr>
-            <p:ph idx="1"/>
-          </p:nvPr>
-        </p:nvSpPr>
-        <p:spPr/>
-        <p:txBody>
-          <a:bodyPr/>
-          <a:lstStyle/>
-          <a:p>
-            <a:r>
-              <a:rPr lang="en-US" dirty="0"/>
-              <a:t>Introduction to Hibernate with Panache</a:t>
-            </a:r>
-          </a:p>
-          <a:p>
-            <a:r>
-              <a:rPr lang="en-US" dirty="0"/>
-              <a:t>Project Set up</a:t>
-            </a:r>
-          </a:p>
-          <a:p>
-            <a:r>
-              <a:rPr lang="en-US" dirty="0"/>
-              <a:t>Defining Entity</a:t>
-            </a:r>
-          </a:p>
-          <a:p>
-            <a:r>
-              <a:rPr lang="en-US" dirty="0"/>
-              <a:t>Defining Repository</a:t>
-            </a:r>
-          </a:p>
-          <a:p>
-            <a:r>
-              <a:rPr lang="en-US" dirty="0"/>
-              <a:t>Implementing CRUD API</a:t>
-            </a:r>
-          </a:p>
-          <a:p>
-            <a:r>
-              <a:rPr lang="en-US" dirty="0"/>
-              <a:t>Transaction Handling</a:t>
-            </a:r>
-          </a:p>
-          <a:p>
-            <a:r>
-              <a:rPr lang="en-US" dirty="0"/>
-              <a:t>Advanced Queries</a:t>
+              <a:t>Part 3</a:t>
+            </a:r>
+          </a:p>
+        </p:txBody>
+      </p:sp>
+      <p:sp>
+        <p:nvSpPr>
+          <p:cNvPr id="5" name="Text Placeholder 4">
+            <a:extLst>
+              <a:ext uri="{FF2B5EF4-FFF2-40B4-BE49-F238E27FC236}">
+                <a16:creationId xmlns:a16="http://schemas.microsoft.com/office/drawing/2014/main" id="{6A5C0139-442F-0248-8D78-CBA48E89F2BC}"/>
+              </a:ext>
+            </a:extLst>
+          </p:cNvPr>
+          <p:cNvSpPr>
+            <a:spLocks noGrp="1"/>
+          </p:cNvSpPr>
+          <p:nvPr>
+            <p:ph type="body" idx="1"/>
+          </p:nvPr>
+        </p:nvSpPr>
+        <p:spPr/>
+        <p:txBody>
+          <a:bodyPr/>
+          <a:lstStyle/>
+          <a:p>
+            <a:r>
+              <a:rPr lang="en-US" dirty="0"/>
+              <a:t>Data Access using Hibernate ORM with Panache &amp; H2 Database</a:t>
             </a:r>
           </a:p>
         </p:txBody>
@@ -5109,7 +5127,7 @@
     </p:spTree>
     <p:extLst>
       <p:ext uri="{BB962C8B-B14F-4D97-AF65-F5344CB8AC3E}">
-        <p14:creationId xmlns:p14="http://schemas.microsoft.com/office/powerpoint/2010/main" val="2827223377"/>
+        <p14:creationId xmlns:p14="http://schemas.microsoft.com/office/powerpoint/2010/main" val="490336528"/>
       </p:ext>
     </p:extLst>
   </p:cSld>
@@ -5138,6 +5156,128 @@
       </p:grpSpPr>
       <p:sp>
         <p:nvSpPr>
+          <p:cNvPr id="4" name="Title 3">
+            <a:extLst>
+              <a:ext uri="{FF2B5EF4-FFF2-40B4-BE49-F238E27FC236}">
+                <a16:creationId xmlns:a16="http://schemas.microsoft.com/office/drawing/2014/main" id="{65247FB2-75C9-0142-8A6A-406C101A9DEC}"/>
+              </a:ext>
+            </a:extLst>
+          </p:cNvPr>
+          <p:cNvSpPr>
+            <a:spLocks noGrp="1"/>
+          </p:cNvSpPr>
+          <p:nvPr>
+            <p:ph type="title"/>
+          </p:nvPr>
+        </p:nvSpPr>
+        <p:spPr/>
+        <p:txBody>
+          <a:bodyPr/>
+          <a:lstStyle/>
+          <a:p>
+            <a:r>
+              <a:rPr lang="en-US" dirty="0"/>
+              <a:t>Agenda</a:t>
+            </a:r>
+          </a:p>
+        </p:txBody>
+      </p:sp>
+      <p:sp>
+        <p:nvSpPr>
+          <p:cNvPr id="5" name="Content Placeholder 4">
+            <a:extLst>
+              <a:ext uri="{FF2B5EF4-FFF2-40B4-BE49-F238E27FC236}">
+                <a16:creationId xmlns:a16="http://schemas.microsoft.com/office/drawing/2014/main" id="{6919ECD4-9677-5345-84C0-4113AF29FA6C}"/>
+              </a:ext>
+            </a:extLst>
+          </p:cNvPr>
+          <p:cNvSpPr>
+            <a:spLocks noGrp="1"/>
+          </p:cNvSpPr>
+          <p:nvPr>
+            <p:ph idx="1"/>
+          </p:nvPr>
+        </p:nvSpPr>
+        <p:spPr/>
+        <p:txBody>
+          <a:bodyPr/>
+          <a:lstStyle/>
+          <a:p>
+            <a:r>
+              <a:rPr lang="en-US" dirty="0"/>
+              <a:t>Introduction to Hibernate with Panache</a:t>
+            </a:r>
+          </a:p>
+          <a:p>
+            <a:r>
+              <a:rPr lang="en-US" dirty="0"/>
+              <a:t>Project Set up</a:t>
+            </a:r>
+          </a:p>
+          <a:p>
+            <a:r>
+              <a:rPr lang="en-US" dirty="0"/>
+              <a:t>Defining Entity</a:t>
+            </a:r>
+          </a:p>
+          <a:p>
+            <a:r>
+              <a:rPr lang="en-US" dirty="0"/>
+              <a:t>Defining Repository</a:t>
+            </a:r>
+          </a:p>
+          <a:p>
+            <a:r>
+              <a:rPr lang="en-US" dirty="0"/>
+              <a:t>Implementing CRUD API</a:t>
+            </a:r>
+          </a:p>
+          <a:p>
+            <a:r>
+              <a:rPr lang="en-US" dirty="0"/>
+              <a:t>Transaction Handling</a:t>
+            </a:r>
+          </a:p>
+          <a:p>
+            <a:r>
+              <a:rPr lang="en-US" dirty="0"/>
+              <a:t>Advanced Queries</a:t>
+            </a:r>
+          </a:p>
+        </p:txBody>
+      </p:sp>
+    </p:spTree>
+    <p:extLst>
+      <p:ext uri="{BB962C8B-B14F-4D97-AF65-F5344CB8AC3E}">
+        <p14:creationId xmlns:p14="http://schemas.microsoft.com/office/powerpoint/2010/main" val="2827223377"/>
+      </p:ext>
+    </p:extLst>
+  </p:cSld>
+  <p:clrMapOvr>
+    <a:masterClrMapping/>
+  </p:clrMapOvr>
+</p:sld>
+</file>
+
+<file path=ppt/slides/slide22.xml><?xml version="1.0" encoding="utf-8"?>
+<p:sld xmlns:a="http://schemas.openxmlformats.org/drawingml/2006/main" xmlns:r="http://schemas.openxmlformats.org/officeDocument/2006/relationships" xmlns:p="http://schemas.openxmlformats.org/presentationml/2006/main">
+  <p:cSld>
+    <p:spTree>
+      <p:nvGrpSpPr>
+        <p:cNvPr id="1" name=""/>
+        <p:cNvGrpSpPr/>
+        <p:nvPr/>
+      </p:nvGrpSpPr>
+      <p:grpSpPr>
+        <a:xfrm>
+          <a:off x="0" y="0"/>
+          <a:ext cx="0" cy="0"/>
+          <a:chOff x="0" y="0"/>
+          <a:chExt cx="0" cy="0"/>
+        </a:xfrm>
+      </p:grpSpPr>
+      <p:sp>
+        <p:nvSpPr>
           <p:cNvPr id="2" name="Title 1">
             <a:extLst>
               <a:ext uri="{FF2B5EF4-FFF2-40B4-BE49-F238E27FC236}">
@@ -5241,7 +5381,7 @@
 </p:sld>
 </file>
 
-<file path=ppt/slides/slide22.xml><?xml version="1.0" encoding="utf-8"?>
+<file path=ppt/slides/slide23.xml><?xml version="1.0" encoding="utf-8"?>
 <p:sld xmlns:a="http://schemas.openxmlformats.org/drawingml/2006/main" xmlns:r="http://schemas.openxmlformats.org/officeDocument/2006/relationships" xmlns:p="http://schemas.openxmlformats.org/presentationml/2006/main">
   <p:cSld>
     <p:spTree>
@@ -5449,7 +5589,7 @@
 </p:sld>
 </file>
 
-<file path=ppt/slides/slide23.xml><?xml version="1.0" encoding="utf-8"?>
+<file path=ppt/slides/slide24.xml><?xml version="1.0" encoding="utf-8"?>
 <p:sld xmlns:a="http://schemas.openxmlformats.org/drawingml/2006/main" xmlns:r="http://schemas.openxmlformats.org/officeDocument/2006/relationships" xmlns:p="http://schemas.openxmlformats.org/presentationml/2006/main">
   <p:cSld>
     <p:spTree>
@@ -5660,7 +5800,7 @@
 </p:sld>
 </file>
 
-<file path=ppt/slides/slide24.xml><?xml version="1.0" encoding="utf-8"?>
+<file path=ppt/slides/slide25.xml><?xml version="1.0" encoding="utf-8"?>
 <p:sld xmlns:a="http://schemas.openxmlformats.org/drawingml/2006/main" xmlns:r="http://schemas.openxmlformats.org/officeDocument/2006/relationships" xmlns:p="http://schemas.openxmlformats.org/presentationml/2006/main">
   <p:cSld>
     <p:spTree>
@@ -5829,7 +5969,7 @@
 </p:sld>
 </file>
 
-<file path=ppt/slides/slide25.xml><?xml version="1.0" encoding="utf-8"?>
+<file path=ppt/slides/slide26.xml><?xml version="1.0" encoding="utf-8"?>
 <p:sld xmlns:a="http://schemas.openxmlformats.org/drawingml/2006/main" xmlns:r="http://schemas.openxmlformats.org/officeDocument/2006/relationships" xmlns:p="http://schemas.openxmlformats.org/presentationml/2006/main">
   <p:cSld>
     <p:spTree>
@@ -5980,7 +6120,7 @@
 </p:sld>
 </file>
 
-<file path=ppt/slides/slide26.xml><?xml version="1.0" encoding="utf-8"?>
+<file path=ppt/slides/slide27.xml><?xml version="1.0" encoding="utf-8"?>
 <p:sld xmlns:a="http://schemas.openxmlformats.org/drawingml/2006/main" xmlns:r="http://schemas.openxmlformats.org/officeDocument/2006/relationships" xmlns:p="http://schemas.openxmlformats.org/presentationml/2006/main">
   <p:cSld>
     <p:spTree>
@@ -6089,7 +6229,7 @@
 </p:sld>
 </file>
 
-<file path=ppt/slides/slide27.xml><?xml version="1.0" encoding="utf-8"?>
+<file path=ppt/slides/slide28.xml><?xml version="1.0" encoding="utf-8"?>
 <p:sld xmlns:a="http://schemas.openxmlformats.org/drawingml/2006/main" xmlns:r="http://schemas.openxmlformats.org/officeDocument/2006/relationships" xmlns:p="http://schemas.openxmlformats.org/presentationml/2006/main">
   <p:cSld>
     <p:spTree>
@@ -6292,69 +6432,6 @@
 </p:sld>
 </file>
 
-<file path=ppt/slides/slide28.xml><?xml version="1.0" encoding="utf-8"?>
-<p:sld xmlns:a="http://schemas.openxmlformats.org/drawingml/2006/main" xmlns:r="http://schemas.openxmlformats.org/officeDocument/2006/relationships" xmlns:p="http://schemas.openxmlformats.org/presentationml/2006/main">
-  <p:cSld>
-    <p:spTree>
-      <p:nvGrpSpPr>
-        <p:cNvPr id="1" name=""/>
-        <p:cNvGrpSpPr/>
-        <p:nvPr/>
-      </p:nvGrpSpPr>
-      <p:grpSpPr>
-        <a:xfrm>
-          <a:off x="0" y="0"/>
-          <a:ext cx="0" cy="0"/>
-          <a:chOff x="0" y="0"/>
-          <a:chExt cx="0" cy="0"/>
-        </a:xfrm>
-      </p:grpSpPr>
-      <p:sp>
-        <p:nvSpPr>
-          <p:cNvPr id="3" name="Content Placeholder 2">
-            <a:extLst>
-              <a:ext uri="{FF2B5EF4-FFF2-40B4-BE49-F238E27FC236}">
-                <a16:creationId xmlns:a16="http://schemas.microsoft.com/office/drawing/2014/main" id="{6953598C-B006-A742-992D-4467BFEF7FF2}"/>
-              </a:ext>
-            </a:extLst>
-          </p:cNvPr>
-          <p:cNvSpPr>
-            <a:spLocks noGrp="1"/>
-          </p:cNvSpPr>
-          <p:nvPr>
-            <p:ph idx="1"/>
-          </p:nvPr>
-        </p:nvSpPr>
-        <p:spPr/>
-        <p:txBody>
-          <a:bodyPr>
-            <a:normAutofit/>
-          </a:bodyPr>
-          <a:lstStyle/>
-          <a:p>
-            <a:pPr marL="0" indent="0">
-              <a:buNone/>
-            </a:pPr>
-            <a:r>
-              <a:rPr lang="en-US" sz="4000" dirty="0"/>
-              <a:t>End</a:t>
-            </a:r>
-          </a:p>
-        </p:txBody>
-      </p:sp>
-    </p:spTree>
-    <p:extLst>
-      <p:ext uri="{BB962C8B-B14F-4D97-AF65-F5344CB8AC3E}">
-        <p14:creationId xmlns:p14="http://schemas.microsoft.com/office/powerpoint/2010/main" val="2065494447"/>
-      </p:ext>
-    </p:extLst>
-  </p:cSld>
-  <p:clrMapOvr>
-    <a:masterClrMapping/>
-  </p:clrMapOvr>
-</p:sld>
-</file>
-
 <file path=ppt/slides/slide29.xml><?xml version="1.0" encoding="utf-8"?>
 <p:sld xmlns:a="http://schemas.openxmlformats.org/drawingml/2006/main" xmlns:r="http://schemas.openxmlformats.org/officeDocument/2006/relationships" xmlns:p="http://schemas.openxmlformats.org/presentationml/2006/main">
   <p:cSld>
@@ -6374,56 +6451,33 @@
       </p:grpSpPr>
       <p:sp>
         <p:nvSpPr>
-          <p:cNvPr id="4" name="Title 3">
-            <a:extLst>
-              <a:ext uri="{FF2B5EF4-FFF2-40B4-BE49-F238E27FC236}">
-                <a16:creationId xmlns:a16="http://schemas.microsoft.com/office/drawing/2014/main" id="{AFC6C8BB-4519-0A42-AF34-20D217EBE51F}"/>
-              </a:ext>
-            </a:extLst>
-          </p:cNvPr>
-          <p:cNvSpPr>
-            <a:spLocks noGrp="1"/>
-          </p:cNvSpPr>
-          <p:nvPr>
-            <p:ph type="title"/>
-          </p:nvPr>
-        </p:nvSpPr>
-        <p:spPr/>
-        <p:txBody>
-          <a:bodyPr/>
-          <a:lstStyle/>
-          <a:p>
-            <a:r>
-              <a:rPr lang="en-US" dirty="0"/>
-              <a:t>Part 4</a:t>
-            </a:r>
-          </a:p>
-        </p:txBody>
-      </p:sp>
-      <p:sp>
-        <p:nvSpPr>
-          <p:cNvPr id="5" name="Text Placeholder 4">
-            <a:extLst>
-              <a:ext uri="{FF2B5EF4-FFF2-40B4-BE49-F238E27FC236}">
-                <a16:creationId xmlns:a16="http://schemas.microsoft.com/office/drawing/2014/main" id="{0EDF15DE-59E5-684F-98F3-06C377ABC2E8}"/>
-              </a:ext>
-            </a:extLst>
-          </p:cNvPr>
-          <p:cNvSpPr>
-            <a:spLocks noGrp="1"/>
-          </p:cNvSpPr>
-          <p:nvPr>
-            <p:ph type="body" idx="1"/>
-          </p:nvPr>
-        </p:nvSpPr>
-        <p:spPr/>
-        <p:txBody>
-          <a:bodyPr/>
-          <a:lstStyle/>
-          <a:p>
-            <a:r>
-              <a:rPr lang="en-US" dirty="0"/>
-              <a:t>Data Access with ‘zero config’ database &amp; ‘production’ database</a:t>
+          <p:cNvPr id="3" name="Content Placeholder 2">
+            <a:extLst>
+              <a:ext uri="{FF2B5EF4-FFF2-40B4-BE49-F238E27FC236}">
+                <a16:creationId xmlns:a16="http://schemas.microsoft.com/office/drawing/2014/main" id="{6953598C-B006-A742-992D-4467BFEF7FF2}"/>
+              </a:ext>
+            </a:extLst>
+          </p:cNvPr>
+          <p:cNvSpPr>
+            <a:spLocks noGrp="1"/>
+          </p:cNvSpPr>
+          <p:nvPr>
+            <p:ph idx="1"/>
+          </p:nvPr>
+        </p:nvSpPr>
+        <p:spPr/>
+        <p:txBody>
+          <a:bodyPr>
+            <a:normAutofit/>
+          </a:bodyPr>
+          <a:lstStyle/>
+          <a:p>
+            <a:pPr marL="0" indent="0">
+              <a:buNone/>
+            </a:pPr>
+            <a:r>
+              <a:rPr lang="en-US" sz="4000" dirty="0"/>
+              <a:t>End</a:t>
             </a:r>
           </a:p>
         </p:txBody>
@@ -6431,7 +6485,7 @@
     </p:spTree>
     <p:extLst>
       <p:ext uri="{BB962C8B-B14F-4D97-AF65-F5344CB8AC3E}">
-        <p14:creationId xmlns:p14="http://schemas.microsoft.com/office/powerpoint/2010/main" val="3092484730"/>
+        <p14:creationId xmlns:p14="http://schemas.microsoft.com/office/powerpoint/2010/main" val="2065494447"/>
       </p:ext>
     </p:extLst>
   </p:cSld>
@@ -6463,7 +6517,7 @@
           <p:cNvPr id="4" name="Title 3">
             <a:extLst>
               <a:ext uri="{FF2B5EF4-FFF2-40B4-BE49-F238E27FC236}">
-                <a16:creationId xmlns:a16="http://schemas.microsoft.com/office/drawing/2014/main" id="{5E4B67D0-A11B-4042-9ECD-82F2AE9FB9C0}"/>
+                <a16:creationId xmlns:a16="http://schemas.microsoft.com/office/drawing/2014/main" id="{9C06D9B5-A2AB-B443-8785-242FE8223C3E}"/>
               </a:ext>
             </a:extLst>
           </p:cNvPr>
@@ -6481,129 +6535,43 @@
           <a:p>
             <a:r>
               <a:rPr lang="en-US" dirty="0"/>
-              <a:t>Quarkus Database Support</a:t>
-            </a:r>
-          </a:p>
-        </p:txBody>
-      </p:sp>
-      <p:sp>
-        <p:nvSpPr>
-          <p:cNvPr id="5" name="Content Placeholder 4">
-            <a:extLst>
-              <a:ext uri="{FF2B5EF4-FFF2-40B4-BE49-F238E27FC236}">
-                <a16:creationId xmlns:a16="http://schemas.microsoft.com/office/drawing/2014/main" id="{86987528-C856-0A46-BAC6-DDE8130F08FC}"/>
-              </a:ext>
-            </a:extLst>
-          </p:cNvPr>
-          <p:cNvSpPr>
-            <a:spLocks noGrp="1"/>
-          </p:cNvSpPr>
-          <p:nvPr>
-            <p:ph idx="1"/>
-          </p:nvPr>
-        </p:nvSpPr>
-        <p:spPr/>
-        <p:txBody>
-          <a:bodyPr>
-            <a:normAutofit lnSpcReduction="10000"/>
-          </a:bodyPr>
-          <a:lstStyle/>
-          <a:p>
-            <a:r>
-              <a:rPr lang="en-US" sz="2400" dirty="0"/>
-              <a:t>Quarkus RDBMS support is provided by extensions</a:t>
-            </a:r>
-          </a:p>
-          <a:p>
-            <a:r>
-              <a:rPr lang="en-US" sz="2400" dirty="0"/>
-              <a:t>Quarkus supports following RDBMS access</a:t>
-            </a:r>
-          </a:p>
-          <a:p>
-            <a:pPr lvl="1"/>
-            <a:r>
-              <a:rPr lang="en-US" sz="2000" dirty="0"/>
-              <a:t>MySql</a:t>
-            </a:r>
-          </a:p>
-          <a:p>
-            <a:pPr lvl="1"/>
-            <a:r>
-              <a:rPr lang="en-US" sz="2000" dirty="0"/>
-              <a:t>PostgreSQL</a:t>
-            </a:r>
-          </a:p>
-          <a:p>
-            <a:pPr lvl="1"/>
-            <a:r>
-              <a:rPr lang="en-US" sz="2000" dirty="0"/>
-              <a:t>Oracle</a:t>
-            </a:r>
-          </a:p>
-          <a:p>
-            <a:pPr lvl="1"/>
-            <a:r>
-              <a:rPr lang="en-US" sz="2000" dirty="0"/>
-              <a:t>Microsoft SQL Server</a:t>
-            </a:r>
-          </a:p>
-          <a:p>
-            <a:pPr lvl="1"/>
-            <a:r>
-              <a:rPr lang="en-US" sz="2000" dirty="0"/>
-              <a:t>DB2, </a:t>
-            </a:r>
-          </a:p>
-          <a:p>
-            <a:pPr lvl="1"/>
-            <a:r>
-              <a:rPr lang="en-US" sz="2000" dirty="0" err="1"/>
-              <a:t>MariaDb</a:t>
-            </a:r>
-            <a:endParaRPr lang="en-US" sz="2000" dirty="0"/>
-          </a:p>
-          <a:p>
-            <a:pPr lvl="1"/>
-            <a:r>
-              <a:rPr lang="en-US" sz="2000" dirty="0"/>
-              <a:t>Derby, H2 – in memory</a:t>
-            </a:r>
-          </a:p>
-          <a:p>
-            <a:pPr lvl="1"/>
-            <a:endParaRPr lang="en-US" sz="2000" dirty="0"/>
-          </a:p>
-          <a:p>
-            <a:r>
-              <a:rPr lang="en-US" sz="2400" dirty="0"/>
-              <a:t>Both regular and Reactive datasource are supported</a:t>
-            </a:r>
-          </a:p>
-          <a:p>
-            <a:r>
-              <a:rPr lang="en-US" sz="2400" dirty="0"/>
-              <a:t>In </a:t>
-            </a:r>
-            <a:r>
-              <a:rPr lang="en-US" sz="2400" i="1" dirty="0"/>
-              <a:t>dev</a:t>
-            </a:r>
-            <a:r>
-              <a:rPr lang="en-US" sz="2400" dirty="0"/>
-              <a:t> mode, ‘zero config’ container based databases can be used</a:t>
-            </a:r>
-          </a:p>
-          <a:p>
-            <a:pPr lvl="1"/>
-            <a:endParaRPr lang="en-US" dirty="0"/>
+              <a:t>Part 1</a:t>
+            </a:r>
+          </a:p>
+        </p:txBody>
+      </p:sp>
+      <p:sp>
+        <p:nvSpPr>
+          <p:cNvPr id="5" name="Subtitle 4">
+            <a:extLst>
+              <a:ext uri="{FF2B5EF4-FFF2-40B4-BE49-F238E27FC236}">
+                <a16:creationId xmlns:a16="http://schemas.microsoft.com/office/drawing/2014/main" id="{3558F535-CCCB-A641-BAE3-158E1E8CB17A}"/>
+              </a:ext>
+            </a:extLst>
+          </p:cNvPr>
+          <p:cNvSpPr>
+            <a:spLocks noGrp="1"/>
+          </p:cNvSpPr>
+          <p:nvPr>
+            <p:ph type="body" idx="1"/>
+          </p:nvPr>
+        </p:nvSpPr>
+        <p:spPr/>
+        <p:txBody>
+          <a:bodyPr/>
+          <a:lstStyle/>
+          <a:p>
+            <a:r>
+              <a:rPr lang="en-US" dirty="0"/>
+              <a:t>Introduction to Database Support &amp; A Sample Application </a:t>
+            </a:r>
           </a:p>
         </p:txBody>
       </p:sp>
     </p:spTree>
     <p:extLst>
       <p:ext uri="{BB962C8B-B14F-4D97-AF65-F5344CB8AC3E}">
-        <p14:creationId xmlns:p14="http://schemas.microsoft.com/office/powerpoint/2010/main" val="4264033659"/>
+        <p14:creationId xmlns:p14="http://schemas.microsoft.com/office/powerpoint/2010/main" val="1499578661"/>
       </p:ext>
     </p:extLst>
   </p:cSld>
@@ -6635,7 +6603,7 @@
           <p:cNvPr id="4" name="Title 3">
             <a:extLst>
               <a:ext uri="{FF2B5EF4-FFF2-40B4-BE49-F238E27FC236}">
-                <a16:creationId xmlns:a16="http://schemas.microsoft.com/office/drawing/2014/main" id="{4C876402-B8CE-0148-A17C-8C4C482C0674}"/>
+                <a16:creationId xmlns:a16="http://schemas.microsoft.com/office/drawing/2014/main" id="{AFC6C8BB-4519-0A42-AF34-20D217EBE51F}"/>
               </a:ext>
             </a:extLst>
           </p:cNvPr>
@@ -6653,53 +6621,35 @@
           <a:p>
             <a:r>
               <a:rPr lang="en-US" dirty="0"/>
-              <a:t>Agenda</a:t>
-            </a:r>
-          </a:p>
-        </p:txBody>
-      </p:sp>
-      <p:sp>
-        <p:nvSpPr>
-          <p:cNvPr id="5" name="Content Placeholder 4">
-            <a:extLst>
-              <a:ext uri="{FF2B5EF4-FFF2-40B4-BE49-F238E27FC236}">
-                <a16:creationId xmlns:a16="http://schemas.microsoft.com/office/drawing/2014/main" id="{A96F27E2-B808-8F44-A3C8-61479A832DEA}"/>
-              </a:ext>
-            </a:extLst>
-          </p:cNvPr>
-          <p:cNvSpPr>
-            <a:spLocks noGrp="1"/>
-          </p:cNvSpPr>
-          <p:nvPr>
-            <p:ph idx="1"/>
-          </p:nvPr>
-        </p:nvSpPr>
-        <p:spPr/>
-        <p:txBody>
-          <a:bodyPr/>
-          <a:lstStyle/>
-          <a:p>
-            <a:r>
-              <a:rPr lang="en-US" dirty="0"/>
-              <a:t>Introduction to Dev Service</a:t>
-            </a:r>
-          </a:p>
-          <a:p>
-            <a:r>
-              <a:rPr lang="en-US" dirty="0"/>
-              <a:t>Connecting to Dev Service Database</a:t>
-            </a:r>
-          </a:p>
-          <a:p>
-            <a:r>
-              <a:rPr lang="en-US" dirty="0"/>
-              <a:t>Demonstration – Running against Dev Database</a:t>
-            </a:r>
-          </a:p>
-          <a:p>
-            <a:r>
-              <a:rPr lang="en-US" dirty="0"/>
-              <a:t>Connecting to ‘PROD’ Database</a:t>
+              <a:t>Part 4</a:t>
+            </a:r>
+          </a:p>
+        </p:txBody>
+      </p:sp>
+      <p:sp>
+        <p:nvSpPr>
+          <p:cNvPr id="5" name="Text Placeholder 4">
+            <a:extLst>
+              <a:ext uri="{FF2B5EF4-FFF2-40B4-BE49-F238E27FC236}">
+                <a16:creationId xmlns:a16="http://schemas.microsoft.com/office/drawing/2014/main" id="{0EDF15DE-59E5-684F-98F3-06C377ABC2E8}"/>
+              </a:ext>
+            </a:extLst>
+          </p:cNvPr>
+          <p:cNvSpPr>
+            <a:spLocks noGrp="1"/>
+          </p:cNvSpPr>
+          <p:nvPr>
+            <p:ph type="body" idx="1"/>
+          </p:nvPr>
+        </p:nvSpPr>
+        <p:spPr/>
+        <p:txBody>
+          <a:bodyPr/>
+          <a:lstStyle/>
+          <a:p>
+            <a:r>
+              <a:rPr lang="en-US" dirty="0"/>
+              <a:t>Data Access with ‘zero config’ database &amp; ‘production’ database</a:t>
             </a:r>
           </a:p>
         </p:txBody>
@@ -6707,7 +6657,7 @@
     </p:spTree>
     <p:extLst>
       <p:ext uri="{BB962C8B-B14F-4D97-AF65-F5344CB8AC3E}">
-        <p14:creationId xmlns:p14="http://schemas.microsoft.com/office/powerpoint/2010/main" val="1368785030"/>
+        <p14:creationId xmlns:p14="http://schemas.microsoft.com/office/powerpoint/2010/main" val="3092484730"/>
       </p:ext>
     </p:extLst>
   </p:cSld>
@@ -6736,6 +6686,110 @@
       </p:grpSpPr>
       <p:sp>
         <p:nvSpPr>
+          <p:cNvPr id="4" name="Title 3">
+            <a:extLst>
+              <a:ext uri="{FF2B5EF4-FFF2-40B4-BE49-F238E27FC236}">
+                <a16:creationId xmlns:a16="http://schemas.microsoft.com/office/drawing/2014/main" id="{4C876402-B8CE-0148-A17C-8C4C482C0674}"/>
+              </a:ext>
+            </a:extLst>
+          </p:cNvPr>
+          <p:cNvSpPr>
+            <a:spLocks noGrp="1"/>
+          </p:cNvSpPr>
+          <p:nvPr>
+            <p:ph type="title"/>
+          </p:nvPr>
+        </p:nvSpPr>
+        <p:spPr/>
+        <p:txBody>
+          <a:bodyPr/>
+          <a:lstStyle/>
+          <a:p>
+            <a:r>
+              <a:rPr lang="en-US" dirty="0"/>
+              <a:t>Agenda</a:t>
+            </a:r>
+          </a:p>
+        </p:txBody>
+      </p:sp>
+      <p:sp>
+        <p:nvSpPr>
+          <p:cNvPr id="5" name="Content Placeholder 4">
+            <a:extLst>
+              <a:ext uri="{FF2B5EF4-FFF2-40B4-BE49-F238E27FC236}">
+                <a16:creationId xmlns:a16="http://schemas.microsoft.com/office/drawing/2014/main" id="{A96F27E2-B808-8F44-A3C8-61479A832DEA}"/>
+              </a:ext>
+            </a:extLst>
+          </p:cNvPr>
+          <p:cNvSpPr>
+            <a:spLocks noGrp="1"/>
+          </p:cNvSpPr>
+          <p:nvPr>
+            <p:ph idx="1"/>
+          </p:nvPr>
+        </p:nvSpPr>
+        <p:spPr/>
+        <p:txBody>
+          <a:bodyPr/>
+          <a:lstStyle/>
+          <a:p>
+            <a:r>
+              <a:rPr lang="en-US" dirty="0"/>
+              <a:t>Introduction to Dev Service</a:t>
+            </a:r>
+          </a:p>
+          <a:p>
+            <a:r>
+              <a:rPr lang="en-US" dirty="0"/>
+              <a:t>Connecting to Dev Service Database</a:t>
+            </a:r>
+          </a:p>
+          <a:p>
+            <a:r>
+              <a:rPr lang="en-US" dirty="0"/>
+              <a:t>Demonstration – Running against Dev Database</a:t>
+            </a:r>
+          </a:p>
+          <a:p>
+            <a:r>
+              <a:rPr lang="en-US" dirty="0"/>
+              <a:t>Connecting to ‘PROD’ Database</a:t>
+            </a:r>
+          </a:p>
+        </p:txBody>
+      </p:sp>
+    </p:spTree>
+    <p:extLst>
+      <p:ext uri="{BB962C8B-B14F-4D97-AF65-F5344CB8AC3E}">
+        <p14:creationId xmlns:p14="http://schemas.microsoft.com/office/powerpoint/2010/main" val="1368785030"/>
+      </p:ext>
+    </p:extLst>
+  </p:cSld>
+  <p:clrMapOvr>
+    <a:masterClrMapping/>
+  </p:clrMapOvr>
+</p:sld>
+</file>
+
+<file path=ppt/slides/slide32.xml><?xml version="1.0" encoding="utf-8"?>
+<p:sld xmlns:a="http://schemas.openxmlformats.org/drawingml/2006/main" xmlns:r="http://schemas.openxmlformats.org/officeDocument/2006/relationships" xmlns:p="http://schemas.openxmlformats.org/presentationml/2006/main">
+  <p:cSld>
+    <p:spTree>
+      <p:nvGrpSpPr>
+        <p:cNvPr id="1" name=""/>
+        <p:cNvGrpSpPr/>
+        <p:nvPr/>
+      </p:nvGrpSpPr>
+      <p:grpSpPr>
+        <a:xfrm>
+          <a:off x="0" y="0"/>
+          <a:ext cx="0" cy="0"/>
+          <a:chOff x="0" y="0"/>
+          <a:chExt cx="0" cy="0"/>
+        </a:xfrm>
+      </p:grpSpPr>
+      <p:sp>
+        <p:nvSpPr>
           <p:cNvPr id="2" name="Title 1">
             <a:extLst>
               <a:ext uri="{FF2B5EF4-FFF2-40B4-BE49-F238E27FC236}">
@@ -6885,7 +6939,7 @@
 </p:sld>
 </file>
 
-<file path=ppt/slides/slide32.xml><?xml version="1.0" encoding="utf-8"?>
+<file path=ppt/slides/slide33.xml><?xml version="1.0" encoding="utf-8"?>
 <p:sld xmlns:a="http://schemas.openxmlformats.org/drawingml/2006/main" xmlns:r="http://schemas.openxmlformats.org/officeDocument/2006/relationships" xmlns:p="http://schemas.openxmlformats.org/presentationml/2006/main">
   <p:cSld>
     <p:spTree>
@@ -7101,7 +7155,7 @@
 </p:sld>
 </file>
 
-<file path=ppt/slides/slide33.xml><?xml version="1.0" encoding="utf-8"?>
+<file path=ppt/slides/slide34.xml><?xml version="1.0" encoding="utf-8"?>
 <p:sld xmlns:a="http://schemas.openxmlformats.org/drawingml/2006/main" xmlns:r="http://schemas.openxmlformats.org/officeDocument/2006/relationships" xmlns:p="http://schemas.openxmlformats.org/presentationml/2006/main">
   <p:cSld>
     <p:spTree>
@@ -7207,7 +7261,7 @@
 </p:sld>
 </file>
 
-<file path=ppt/slides/slide34.xml><?xml version="1.0" encoding="utf-8"?>
+<file path=ppt/slides/slide35.xml><?xml version="1.0" encoding="utf-8"?>
 <p:sld xmlns:a="http://schemas.openxmlformats.org/drawingml/2006/main" xmlns:r="http://schemas.openxmlformats.org/officeDocument/2006/relationships" xmlns:p="http://schemas.openxmlformats.org/presentationml/2006/main">
   <p:cSld>
     <p:spTree>
@@ -7417,69 +7471,6 @@
 </p:sld>
 </file>
 
-<file path=ppt/slides/slide35.xml><?xml version="1.0" encoding="utf-8"?>
-<p:sld xmlns:a="http://schemas.openxmlformats.org/drawingml/2006/main" xmlns:r="http://schemas.openxmlformats.org/officeDocument/2006/relationships" xmlns:p="http://schemas.openxmlformats.org/presentationml/2006/main">
-  <p:cSld>
-    <p:spTree>
-      <p:nvGrpSpPr>
-        <p:cNvPr id="1" name=""/>
-        <p:cNvGrpSpPr/>
-        <p:nvPr/>
-      </p:nvGrpSpPr>
-      <p:grpSpPr>
-        <a:xfrm>
-          <a:off x="0" y="0"/>
-          <a:ext cx="0" cy="0"/>
-          <a:chOff x="0" y="0"/>
-          <a:chExt cx="0" cy="0"/>
-        </a:xfrm>
-      </p:grpSpPr>
-      <p:sp>
-        <p:nvSpPr>
-          <p:cNvPr id="3" name="Content Placeholder 2">
-            <a:extLst>
-              <a:ext uri="{FF2B5EF4-FFF2-40B4-BE49-F238E27FC236}">
-                <a16:creationId xmlns:a16="http://schemas.microsoft.com/office/drawing/2014/main" id="{6953598C-B006-A742-992D-4467BFEF7FF2}"/>
-              </a:ext>
-            </a:extLst>
-          </p:cNvPr>
-          <p:cNvSpPr>
-            <a:spLocks noGrp="1"/>
-          </p:cNvSpPr>
-          <p:nvPr>
-            <p:ph idx="1"/>
-          </p:nvPr>
-        </p:nvSpPr>
-        <p:spPr/>
-        <p:txBody>
-          <a:bodyPr>
-            <a:normAutofit/>
-          </a:bodyPr>
-          <a:lstStyle/>
-          <a:p>
-            <a:pPr marL="0" indent="0">
-              <a:buNone/>
-            </a:pPr>
-            <a:r>
-              <a:rPr lang="en-US" sz="4000" dirty="0"/>
-              <a:t>End</a:t>
-            </a:r>
-          </a:p>
-        </p:txBody>
-      </p:sp>
-    </p:spTree>
-    <p:extLst>
-      <p:ext uri="{BB962C8B-B14F-4D97-AF65-F5344CB8AC3E}">
-        <p14:creationId xmlns:p14="http://schemas.microsoft.com/office/powerpoint/2010/main" val="1741783258"/>
-      </p:ext>
-    </p:extLst>
-  </p:cSld>
-  <p:clrMapOvr>
-    <a:masterClrMapping/>
-  </p:clrMapOvr>
-</p:sld>
-</file>
-
 <file path=ppt/slides/slide36.xml><?xml version="1.0" encoding="utf-8"?>
 <p:sld xmlns:a="http://schemas.openxmlformats.org/drawingml/2006/main" xmlns:r="http://schemas.openxmlformats.org/officeDocument/2006/relationships" xmlns:p="http://schemas.openxmlformats.org/presentationml/2006/main">
   <p:cSld>
@@ -7499,56 +7490,33 @@
       </p:grpSpPr>
       <p:sp>
         <p:nvSpPr>
-          <p:cNvPr id="4" name="Title 3">
-            <a:extLst>
-              <a:ext uri="{FF2B5EF4-FFF2-40B4-BE49-F238E27FC236}">
-                <a16:creationId xmlns:a16="http://schemas.microsoft.com/office/drawing/2014/main" id="{E61C6DAF-80DE-1747-BCC7-70AA8454D65E}"/>
-              </a:ext>
-            </a:extLst>
-          </p:cNvPr>
-          <p:cNvSpPr>
-            <a:spLocks noGrp="1"/>
-          </p:cNvSpPr>
-          <p:nvPr>
-            <p:ph type="title"/>
-          </p:nvPr>
-        </p:nvSpPr>
-        <p:spPr/>
-        <p:txBody>
-          <a:bodyPr/>
-          <a:lstStyle/>
-          <a:p>
-            <a:r>
-              <a:rPr lang="en-US" dirty="0"/>
-              <a:t>Part 5</a:t>
-            </a:r>
-          </a:p>
-        </p:txBody>
-      </p:sp>
-      <p:sp>
-        <p:nvSpPr>
-          <p:cNvPr id="5" name="Text Placeholder 4">
-            <a:extLst>
-              <a:ext uri="{FF2B5EF4-FFF2-40B4-BE49-F238E27FC236}">
-                <a16:creationId xmlns:a16="http://schemas.microsoft.com/office/drawing/2014/main" id="{4E1C7B84-9315-9D4C-9CD3-0906094B08C7}"/>
-              </a:ext>
-            </a:extLst>
-          </p:cNvPr>
-          <p:cNvSpPr>
-            <a:spLocks noGrp="1"/>
-          </p:cNvSpPr>
-          <p:nvPr>
-            <p:ph type="body" idx="1"/>
-          </p:nvPr>
-        </p:nvSpPr>
-        <p:spPr/>
-        <p:txBody>
-          <a:bodyPr/>
-          <a:lstStyle/>
-          <a:p>
-            <a:r>
-              <a:rPr lang="en-US" dirty="0"/>
-              <a:t>Unit Testing Database Access</a:t>
+          <p:cNvPr id="3" name="Content Placeholder 2">
+            <a:extLst>
+              <a:ext uri="{FF2B5EF4-FFF2-40B4-BE49-F238E27FC236}">
+                <a16:creationId xmlns:a16="http://schemas.microsoft.com/office/drawing/2014/main" id="{6953598C-B006-A742-992D-4467BFEF7FF2}"/>
+              </a:ext>
+            </a:extLst>
+          </p:cNvPr>
+          <p:cNvSpPr>
+            <a:spLocks noGrp="1"/>
+          </p:cNvSpPr>
+          <p:nvPr>
+            <p:ph idx="1"/>
+          </p:nvPr>
+        </p:nvSpPr>
+        <p:spPr/>
+        <p:txBody>
+          <a:bodyPr>
+            <a:normAutofit/>
+          </a:bodyPr>
+          <a:lstStyle/>
+          <a:p>
+            <a:pPr marL="0" indent="0">
+              <a:buNone/>
+            </a:pPr>
+            <a:r>
+              <a:rPr lang="en-US" sz="4000" dirty="0"/>
+              <a:t>End</a:t>
             </a:r>
           </a:p>
         </p:txBody>
@@ -7556,7 +7524,7 @@
     </p:spTree>
     <p:extLst>
       <p:ext uri="{BB962C8B-B14F-4D97-AF65-F5344CB8AC3E}">
-        <p14:creationId xmlns:p14="http://schemas.microsoft.com/office/powerpoint/2010/main" val="4128452534"/>
+        <p14:creationId xmlns:p14="http://schemas.microsoft.com/office/powerpoint/2010/main" val="1741783258"/>
       </p:ext>
     </p:extLst>
   </p:cSld>
@@ -7588,7 +7556,7 @@
           <p:cNvPr id="4" name="Title 3">
             <a:extLst>
               <a:ext uri="{FF2B5EF4-FFF2-40B4-BE49-F238E27FC236}">
-                <a16:creationId xmlns:a16="http://schemas.microsoft.com/office/drawing/2014/main" id="{2FFE5A80-B001-C74C-B6AD-CE042095BEB5}"/>
+                <a16:creationId xmlns:a16="http://schemas.microsoft.com/office/drawing/2014/main" id="{E61C6DAF-80DE-1747-BCC7-70AA8454D65E}"/>
               </a:ext>
             </a:extLst>
           </p:cNvPr>
@@ -7606,47 +7574,35 @@
           <a:p>
             <a:r>
               <a:rPr lang="en-US" dirty="0"/>
-              <a:t>Agenda</a:t>
-            </a:r>
-          </a:p>
-        </p:txBody>
-      </p:sp>
-      <p:sp>
-        <p:nvSpPr>
-          <p:cNvPr id="5" name="Content Placeholder 4">
-            <a:extLst>
-              <a:ext uri="{FF2B5EF4-FFF2-40B4-BE49-F238E27FC236}">
-                <a16:creationId xmlns:a16="http://schemas.microsoft.com/office/drawing/2014/main" id="{836632EB-6A6B-1040-861C-F4601F684F3B}"/>
-              </a:ext>
-            </a:extLst>
-          </p:cNvPr>
-          <p:cNvSpPr>
-            <a:spLocks noGrp="1"/>
-          </p:cNvSpPr>
-          <p:nvPr>
-            <p:ph idx="1"/>
-          </p:nvPr>
-        </p:nvSpPr>
-        <p:spPr/>
-        <p:txBody>
-          <a:bodyPr/>
-          <a:lstStyle/>
-          <a:p>
-            <a:r>
-              <a:rPr lang="en-US" dirty="0"/>
-              <a:t>Dependencies for Unit Test</a:t>
-            </a:r>
-          </a:p>
-          <a:p>
-            <a:r>
-              <a:rPr lang="en-US" dirty="0"/>
-              <a:t>Unit Test using Dev Services</a:t>
-            </a:r>
-          </a:p>
-          <a:p>
-            <a:r>
-              <a:rPr lang="en-US" dirty="0"/>
-              <a:t>Unit Test using Mocks</a:t>
+              <a:t>Part 5</a:t>
+            </a:r>
+          </a:p>
+        </p:txBody>
+      </p:sp>
+      <p:sp>
+        <p:nvSpPr>
+          <p:cNvPr id="5" name="Text Placeholder 4">
+            <a:extLst>
+              <a:ext uri="{FF2B5EF4-FFF2-40B4-BE49-F238E27FC236}">
+                <a16:creationId xmlns:a16="http://schemas.microsoft.com/office/drawing/2014/main" id="{4E1C7B84-9315-9D4C-9CD3-0906094B08C7}"/>
+              </a:ext>
+            </a:extLst>
+          </p:cNvPr>
+          <p:cNvSpPr>
+            <a:spLocks noGrp="1"/>
+          </p:cNvSpPr>
+          <p:nvPr>
+            <p:ph type="body" idx="1"/>
+          </p:nvPr>
+        </p:nvSpPr>
+        <p:spPr/>
+        <p:txBody>
+          <a:bodyPr/>
+          <a:lstStyle/>
+          <a:p>
+            <a:r>
+              <a:rPr lang="en-US" dirty="0"/>
+              <a:t>Unit Testing Database Access</a:t>
             </a:r>
           </a:p>
         </p:txBody>
@@ -7654,7 +7610,7 @@
     </p:spTree>
     <p:extLst>
       <p:ext uri="{BB962C8B-B14F-4D97-AF65-F5344CB8AC3E}">
-        <p14:creationId xmlns:p14="http://schemas.microsoft.com/office/powerpoint/2010/main" val="712013078"/>
+        <p14:creationId xmlns:p14="http://schemas.microsoft.com/office/powerpoint/2010/main" val="4128452534"/>
       </p:ext>
     </p:extLst>
   </p:cSld>
@@ -7683,6 +7639,104 @@
       </p:grpSpPr>
       <p:sp>
         <p:nvSpPr>
+          <p:cNvPr id="4" name="Title 3">
+            <a:extLst>
+              <a:ext uri="{FF2B5EF4-FFF2-40B4-BE49-F238E27FC236}">
+                <a16:creationId xmlns:a16="http://schemas.microsoft.com/office/drawing/2014/main" id="{2FFE5A80-B001-C74C-B6AD-CE042095BEB5}"/>
+              </a:ext>
+            </a:extLst>
+          </p:cNvPr>
+          <p:cNvSpPr>
+            <a:spLocks noGrp="1"/>
+          </p:cNvSpPr>
+          <p:nvPr>
+            <p:ph type="title"/>
+          </p:nvPr>
+        </p:nvSpPr>
+        <p:spPr/>
+        <p:txBody>
+          <a:bodyPr/>
+          <a:lstStyle/>
+          <a:p>
+            <a:r>
+              <a:rPr lang="en-US" dirty="0"/>
+              <a:t>Agenda</a:t>
+            </a:r>
+          </a:p>
+        </p:txBody>
+      </p:sp>
+      <p:sp>
+        <p:nvSpPr>
+          <p:cNvPr id="5" name="Content Placeholder 4">
+            <a:extLst>
+              <a:ext uri="{FF2B5EF4-FFF2-40B4-BE49-F238E27FC236}">
+                <a16:creationId xmlns:a16="http://schemas.microsoft.com/office/drawing/2014/main" id="{836632EB-6A6B-1040-861C-F4601F684F3B}"/>
+              </a:ext>
+            </a:extLst>
+          </p:cNvPr>
+          <p:cNvSpPr>
+            <a:spLocks noGrp="1"/>
+          </p:cNvSpPr>
+          <p:nvPr>
+            <p:ph idx="1"/>
+          </p:nvPr>
+        </p:nvSpPr>
+        <p:spPr/>
+        <p:txBody>
+          <a:bodyPr/>
+          <a:lstStyle/>
+          <a:p>
+            <a:r>
+              <a:rPr lang="en-US" dirty="0"/>
+              <a:t>Dependencies for Unit Test</a:t>
+            </a:r>
+          </a:p>
+          <a:p>
+            <a:r>
+              <a:rPr lang="en-US" dirty="0"/>
+              <a:t>Unit Test using Dev Services</a:t>
+            </a:r>
+          </a:p>
+          <a:p>
+            <a:r>
+              <a:rPr lang="en-US" dirty="0"/>
+              <a:t>Unit Test using Mocks</a:t>
+            </a:r>
+          </a:p>
+        </p:txBody>
+      </p:sp>
+    </p:spTree>
+    <p:extLst>
+      <p:ext uri="{BB962C8B-B14F-4D97-AF65-F5344CB8AC3E}">
+        <p14:creationId xmlns:p14="http://schemas.microsoft.com/office/powerpoint/2010/main" val="712013078"/>
+      </p:ext>
+    </p:extLst>
+  </p:cSld>
+  <p:clrMapOvr>
+    <a:masterClrMapping/>
+  </p:clrMapOvr>
+</p:sld>
+</file>
+
+<file path=ppt/slides/slide39.xml><?xml version="1.0" encoding="utf-8"?>
+<p:sld xmlns:a="http://schemas.openxmlformats.org/drawingml/2006/main" xmlns:r="http://schemas.openxmlformats.org/officeDocument/2006/relationships" xmlns:p="http://schemas.openxmlformats.org/presentationml/2006/main">
+  <p:cSld>
+    <p:spTree>
+      <p:nvGrpSpPr>
+        <p:cNvPr id="1" name=""/>
+        <p:cNvGrpSpPr/>
+        <p:nvPr/>
+      </p:nvGrpSpPr>
+      <p:grpSpPr>
+        <a:xfrm>
+          <a:off x="0" y="0"/>
+          <a:ext cx="0" cy="0"/>
+          <a:chOff x="0" y="0"/>
+          <a:chExt cx="0" cy="0"/>
+        </a:xfrm>
+      </p:grpSpPr>
+      <p:sp>
+        <p:nvSpPr>
           <p:cNvPr id="2" name="Title 1">
             <a:extLst>
               <a:ext uri="{FF2B5EF4-FFF2-40B4-BE49-F238E27FC236}">
@@ -7811,7 +7865,105 @@
 </p:sld>
 </file>
 
-<file path=ppt/slides/slide39.xml><?xml version="1.0" encoding="utf-8"?>
+<file path=ppt/slides/slide4.xml><?xml version="1.0" encoding="utf-8"?>
+<p:sld xmlns:a="http://schemas.openxmlformats.org/drawingml/2006/main" xmlns:r="http://schemas.openxmlformats.org/officeDocument/2006/relationships" xmlns:p="http://schemas.openxmlformats.org/presentationml/2006/main">
+  <p:cSld>
+    <p:spTree>
+      <p:nvGrpSpPr>
+        <p:cNvPr id="1" name=""/>
+        <p:cNvGrpSpPr/>
+        <p:nvPr/>
+      </p:nvGrpSpPr>
+      <p:grpSpPr>
+        <a:xfrm>
+          <a:off x="0" y="0"/>
+          <a:ext cx="0" cy="0"/>
+          <a:chOff x="0" y="0"/>
+          <a:chExt cx="0" cy="0"/>
+        </a:xfrm>
+      </p:grpSpPr>
+      <p:sp>
+        <p:nvSpPr>
+          <p:cNvPr id="2" name="Title 1">
+            <a:extLst>
+              <a:ext uri="{FF2B5EF4-FFF2-40B4-BE49-F238E27FC236}">
+                <a16:creationId xmlns:a16="http://schemas.microsoft.com/office/drawing/2014/main" id="{57E1583B-125C-3046-A1E7-155A4C66CDE4}"/>
+              </a:ext>
+            </a:extLst>
+          </p:cNvPr>
+          <p:cNvSpPr>
+            <a:spLocks noGrp="1"/>
+          </p:cNvSpPr>
+          <p:nvPr>
+            <p:ph type="title"/>
+          </p:nvPr>
+        </p:nvSpPr>
+        <p:spPr/>
+        <p:txBody>
+          <a:bodyPr/>
+          <a:lstStyle/>
+          <a:p>
+            <a:r>
+              <a:rPr lang="en-US" dirty="0"/>
+              <a:t>Agenda</a:t>
+            </a:r>
+          </a:p>
+        </p:txBody>
+      </p:sp>
+      <p:sp>
+        <p:nvSpPr>
+          <p:cNvPr id="3" name="Content Placeholder 2">
+            <a:extLst>
+              <a:ext uri="{FF2B5EF4-FFF2-40B4-BE49-F238E27FC236}">
+                <a16:creationId xmlns:a16="http://schemas.microsoft.com/office/drawing/2014/main" id="{DF2D315E-4620-7F43-AAD5-6937F610D51F}"/>
+              </a:ext>
+            </a:extLst>
+          </p:cNvPr>
+          <p:cNvSpPr>
+            <a:spLocks noGrp="1"/>
+          </p:cNvSpPr>
+          <p:nvPr>
+            <p:ph idx="1"/>
+          </p:nvPr>
+        </p:nvSpPr>
+        <p:spPr/>
+        <p:txBody>
+          <a:bodyPr/>
+          <a:lstStyle/>
+          <a:p>
+            <a:r>
+              <a:rPr lang="en-US" dirty="0"/>
+              <a:t>Quarkus Database Support Overview</a:t>
+            </a:r>
+          </a:p>
+          <a:p>
+            <a:r>
+              <a:rPr lang="en-US" dirty="0"/>
+              <a:t>Data Access Approaches</a:t>
+            </a:r>
+          </a:p>
+          <a:p>
+            <a:r>
+              <a:rPr lang="en-US" dirty="0"/>
+              <a:t>Overview of Sample CRUD Application</a:t>
+            </a:r>
+          </a:p>
+        </p:txBody>
+      </p:sp>
+    </p:spTree>
+    <p:extLst>
+      <p:ext uri="{BB962C8B-B14F-4D97-AF65-F5344CB8AC3E}">
+        <p14:creationId xmlns:p14="http://schemas.microsoft.com/office/powerpoint/2010/main" val="812056962"/>
+      </p:ext>
+    </p:extLst>
+  </p:cSld>
+  <p:clrMapOvr>
+    <a:masterClrMapping/>
+  </p:clrMapOvr>
+</p:sld>
+</file>
+
+<file path=ppt/slides/slide40.xml><?xml version="1.0" encoding="utf-8"?>
 <p:sld xmlns:a="http://schemas.openxmlformats.org/drawingml/2006/main" xmlns:r="http://schemas.openxmlformats.org/officeDocument/2006/relationships" xmlns:p="http://schemas.openxmlformats.org/presentationml/2006/main">
   <p:cSld>
     <p:spTree>
@@ -8002,105 +8154,7 @@
 </p:sld>
 </file>
 
-<file path=ppt/slides/slide4.xml><?xml version="1.0" encoding="utf-8"?>
-<p:sld xmlns:a="http://schemas.openxmlformats.org/drawingml/2006/main" xmlns:r="http://schemas.openxmlformats.org/officeDocument/2006/relationships" xmlns:p="http://schemas.openxmlformats.org/presentationml/2006/main">
-  <p:cSld>
-    <p:spTree>
-      <p:nvGrpSpPr>
-        <p:cNvPr id="1" name=""/>
-        <p:cNvGrpSpPr/>
-        <p:nvPr/>
-      </p:nvGrpSpPr>
-      <p:grpSpPr>
-        <a:xfrm>
-          <a:off x="0" y="0"/>
-          <a:ext cx="0" cy="0"/>
-          <a:chOff x="0" y="0"/>
-          <a:chExt cx="0" cy="0"/>
-        </a:xfrm>
-      </p:grpSpPr>
-      <p:sp>
-        <p:nvSpPr>
-          <p:cNvPr id="2" name="Title 1">
-            <a:extLst>
-              <a:ext uri="{FF2B5EF4-FFF2-40B4-BE49-F238E27FC236}">
-                <a16:creationId xmlns:a16="http://schemas.microsoft.com/office/drawing/2014/main" id="{57E1583B-125C-3046-A1E7-155A4C66CDE4}"/>
-              </a:ext>
-            </a:extLst>
-          </p:cNvPr>
-          <p:cNvSpPr>
-            <a:spLocks noGrp="1"/>
-          </p:cNvSpPr>
-          <p:nvPr>
-            <p:ph type="title"/>
-          </p:nvPr>
-        </p:nvSpPr>
-        <p:spPr/>
-        <p:txBody>
-          <a:bodyPr/>
-          <a:lstStyle/>
-          <a:p>
-            <a:r>
-              <a:rPr lang="en-US" dirty="0"/>
-              <a:t>Agenda</a:t>
-            </a:r>
-          </a:p>
-        </p:txBody>
-      </p:sp>
-      <p:sp>
-        <p:nvSpPr>
-          <p:cNvPr id="3" name="Content Placeholder 2">
-            <a:extLst>
-              <a:ext uri="{FF2B5EF4-FFF2-40B4-BE49-F238E27FC236}">
-                <a16:creationId xmlns:a16="http://schemas.microsoft.com/office/drawing/2014/main" id="{DF2D315E-4620-7F43-AAD5-6937F610D51F}"/>
-              </a:ext>
-            </a:extLst>
-          </p:cNvPr>
-          <p:cNvSpPr>
-            <a:spLocks noGrp="1"/>
-          </p:cNvSpPr>
-          <p:nvPr>
-            <p:ph idx="1"/>
-          </p:nvPr>
-        </p:nvSpPr>
-        <p:spPr/>
-        <p:txBody>
-          <a:bodyPr/>
-          <a:lstStyle/>
-          <a:p>
-            <a:r>
-              <a:rPr lang="en-US" dirty="0"/>
-              <a:t>Quarkus Database Support Overview</a:t>
-            </a:r>
-          </a:p>
-          <a:p>
-            <a:r>
-              <a:rPr lang="en-US" dirty="0"/>
-              <a:t>Data Access Approaches</a:t>
-            </a:r>
-          </a:p>
-          <a:p>
-            <a:r>
-              <a:rPr lang="en-US" dirty="0"/>
-              <a:t>Overview of Sample CRUD Application</a:t>
-            </a:r>
-          </a:p>
-        </p:txBody>
-      </p:sp>
-    </p:spTree>
-    <p:extLst>
-      <p:ext uri="{BB962C8B-B14F-4D97-AF65-F5344CB8AC3E}">
-        <p14:creationId xmlns:p14="http://schemas.microsoft.com/office/powerpoint/2010/main" val="812056962"/>
-      </p:ext>
-    </p:extLst>
-  </p:cSld>
-  <p:clrMapOvr>
-    <a:masterClrMapping/>
-  </p:clrMapOvr>
-</p:sld>
-</file>
-
-<file path=ppt/slides/slide40.xml><?xml version="1.0" encoding="utf-8"?>
+<file path=ppt/slides/slide41.xml><?xml version="1.0" encoding="utf-8"?>
 <p:sld xmlns:a="http://schemas.openxmlformats.org/drawingml/2006/main" xmlns:r="http://schemas.openxmlformats.org/officeDocument/2006/relationships" xmlns:p="http://schemas.openxmlformats.org/presentationml/2006/main">
   <p:cSld>
     <p:spTree>
@@ -8279,7 +8333,7 @@
         </p:blipFill>
         <p:spPr>
           <a:xfrm>
-            <a:off x="1159493" y="4165136"/>
+            <a:off x="1159493" y="3916095"/>
             <a:ext cx="9474200" cy="406400"/>
           </a:xfrm>
           <a:prstGeom prst="rect">
@@ -8300,7 +8354,7 @@
 </p:sld>
 </file>
 
-<file path=ppt/slides/slide41.xml><?xml version="1.0" encoding="utf-8"?>
+<file path=ppt/slides/slide42.xml><?xml version="1.0" encoding="utf-8"?>
 <p:sld xmlns:a="http://schemas.openxmlformats.org/drawingml/2006/main" xmlns:r="http://schemas.openxmlformats.org/officeDocument/2006/relationships" xmlns:p="http://schemas.openxmlformats.org/presentationml/2006/main">
   <p:cSld>
     <p:spTree>
@@ -8382,6 +8436,178 @@
       </p:grpSpPr>
       <p:sp>
         <p:nvSpPr>
+          <p:cNvPr id="4" name="Title 3">
+            <a:extLst>
+              <a:ext uri="{FF2B5EF4-FFF2-40B4-BE49-F238E27FC236}">
+                <a16:creationId xmlns:a16="http://schemas.microsoft.com/office/drawing/2014/main" id="{5E4B67D0-A11B-4042-9ECD-82F2AE9FB9C0}"/>
+              </a:ext>
+            </a:extLst>
+          </p:cNvPr>
+          <p:cNvSpPr>
+            <a:spLocks noGrp="1"/>
+          </p:cNvSpPr>
+          <p:nvPr>
+            <p:ph type="title"/>
+          </p:nvPr>
+        </p:nvSpPr>
+        <p:spPr/>
+        <p:txBody>
+          <a:bodyPr/>
+          <a:lstStyle/>
+          <a:p>
+            <a:r>
+              <a:rPr lang="en-US" dirty="0"/>
+              <a:t>Quarkus Database Support</a:t>
+            </a:r>
+          </a:p>
+        </p:txBody>
+      </p:sp>
+      <p:sp>
+        <p:nvSpPr>
+          <p:cNvPr id="5" name="Content Placeholder 4">
+            <a:extLst>
+              <a:ext uri="{FF2B5EF4-FFF2-40B4-BE49-F238E27FC236}">
+                <a16:creationId xmlns:a16="http://schemas.microsoft.com/office/drawing/2014/main" id="{86987528-C856-0A46-BAC6-DDE8130F08FC}"/>
+              </a:ext>
+            </a:extLst>
+          </p:cNvPr>
+          <p:cNvSpPr>
+            <a:spLocks noGrp="1"/>
+          </p:cNvSpPr>
+          <p:nvPr>
+            <p:ph idx="1"/>
+          </p:nvPr>
+        </p:nvSpPr>
+        <p:spPr/>
+        <p:txBody>
+          <a:bodyPr>
+            <a:normAutofit lnSpcReduction="10000"/>
+          </a:bodyPr>
+          <a:lstStyle/>
+          <a:p>
+            <a:r>
+              <a:rPr lang="en-US" sz="2400" dirty="0"/>
+              <a:t>Quarkus RDBMS support is provided by extensions</a:t>
+            </a:r>
+          </a:p>
+          <a:p>
+            <a:r>
+              <a:rPr lang="en-US" sz="2400" dirty="0"/>
+              <a:t>Quarkus supports following RDBMS access</a:t>
+            </a:r>
+          </a:p>
+          <a:p>
+            <a:pPr lvl="1"/>
+            <a:r>
+              <a:rPr lang="en-US" sz="2000" dirty="0"/>
+              <a:t>MySql</a:t>
+            </a:r>
+          </a:p>
+          <a:p>
+            <a:pPr lvl="1"/>
+            <a:r>
+              <a:rPr lang="en-US" sz="2000" dirty="0"/>
+              <a:t>PostgreSQL</a:t>
+            </a:r>
+          </a:p>
+          <a:p>
+            <a:pPr lvl="1"/>
+            <a:r>
+              <a:rPr lang="en-US" sz="2000" dirty="0"/>
+              <a:t>Oracle</a:t>
+            </a:r>
+          </a:p>
+          <a:p>
+            <a:pPr lvl="1"/>
+            <a:r>
+              <a:rPr lang="en-US" sz="2000" dirty="0"/>
+              <a:t>Microsoft SQL Server</a:t>
+            </a:r>
+          </a:p>
+          <a:p>
+            <a:pPr lvl="1"/>
+            <a:r>
+              <a:rPr lang="en-US" sz="2000" dirty="0"/>
+              <a:t>DB2, </a:t>
+            </a:r>
+          </a:p>
+          <a:p>
+            <a:pPr lvl="1"/>
+            <a:r>
+              <a:rPr lang="en-US" sz="2000" dirty="0" err="1"/>
+              <a:t>MariaDb</a:t>
+            </a:r>
+            <a:endParaRPr lang="en-US" sz="2000" dirty="0"/>
+          </a:p>
+          <a:p>
+            <a:pPr lvl="1"/>
+            <a:r>
+              <a:rPr lang="en-US" sz="2000" dirty="0"/>
+              <a:t>Derby, H2 – in memory</a:t>
+            </a:r>
+          </a:p>
+          <a:p>
+            <a:pPr lvl="1"/>
+            <a:endParaRPr lang="en-US" sz="2000" dirty="0"/>
+          </a:p>
+          <a:p>
+            <a:r>
+              <a:rPr lang="en-US" sz="2400" dirty="0"/>
+              <a:t>Both regular and Reactive datasource are supported</a:t>
+            </a:r>
+          </a:p>
+          <a:p>
+            <a:r>
+              <a:rPr lang="en-US" sz="2400" dirty="0"/>
+              <a:t>In </a:t>
+            </a:r>
+            <a:r>
+              <a:rPr lang="en-US" sz="2400" i="1" dirty="0"/>
+              <a:t>dev</a:t>
+            </a:r>
+            <a:r>
+              <a:rPr lang="en-US" sz="2400" dirty="0"/>
+              <a:t> mode, ‘zero config’ container based databases can be used</a:t>
+            </a:r>
+          </a:p>
+          <a:p>
+            <a:pPr lvl="1"/>
+            <a:endParaRPr lang="en-US" dirty="0"/>
+          </a:p>
+        </p:txBody>
+      </p:sp>
+    </p:spTree>
+    <p:extLst>
+      <p:ext uri="{BB962C8B-B14F-4D97-AF65-F5344CB8AC3E}">
+        <p14:creationId xmlns:p14="http://schemas.microsoft.com/office/powerpoint/2010/main" val="4264033659"/>
+      </p:ext>
+    </p:extLst>
+  </p:cSld>
+  <p:clrMapOvr>
+    <a:masterClrMapping/>
+  </p:clrMapOvr>
+</p:sld>
+</file>
+
+<file path=ppt/slides/slide6.xml><?xml version="1.0" encoding="utf-8"?>
+<p:sld xmlns:a="http://schemas.openxmlformats.org/drawingml/2006/main" xmlns:r="http://schemas.openxmlformats.org/officeDocument/2006/relationships" xmlns:p="http://schemas.openxmlformats.org/presentationml/2006/main">
+  <p:cSld>
+    <p:spTree>
+      <p:nvGrpSpPr>
+        <p:cNvPr id="1" name=""/>
+        <p:cNvGrpSpPr/>
+        <p:nvPr/>
+      </p:nvGrpSpPr>
+      <p:grpSpPr>
+        <a:xfrm>
+          <a:off x="0" y="0"/>
+          <a:ext cx="0" cy="0"/>
+          <a:chOff x="0" y="0"/>
+          <a:chExt cx="0" cy="0"/>
+        </a:xfrm>
+      </p:grpSpPr>
+      <p:sp>
+        <p:nvSpPr>
           <p:cNvPr id="2" name="Title 1">
             <a:extLst>
               <a:ext uri="{FF2B5EF4-FFF2-40B4-BE49-F238E27FC236}">
@@ -8491,7 +8717,7 @@
 </p:sld>
 </file>
 
-<file path=ppt/slides/slide6.xml><?xml version="1.0" encoding="utf-8"?>
+<file path=ppt/slides/slide7.xml><?xml version="1.0" encoding="utf-8"?>
 <p:sld xmlns:a="http://schemas.openxmlformats.org/drawingml/2006/main" xmlns:r="http://schemas.openxmlformats.org/officeDocument/2006/relationships" xmlns:p="http://schemas.openxmlformats.org/presentationml/2006/main">
   <p:cSld>
     <p:spTree>
@@ -8677,69 +8903,6 @@
 </p:sld>
 </file>
 
-<file path=ppt/slides/slide7.xml><?xml version="1.0" encoding="utf-8"?>
-<p:sld xmlns:a="http://schemas.openxmlformats.org/drawingml/2006/main" xmlns:r="http://schemas.openxmlformats.org/officeDocument/2006/relationships" xmlns:p="http://schemas.openxmlformats.org/presentationml/2006/main">
-  <p:cSld>
-    <p:spTree>
-      <p:nvGrpSpPr>
-        <p:cNvPr id="1" name=""/>
-        <p:cNvGrpSpPr/>
-        <p:nvPr/>
-      </p:nvGrpSpPr>
-      <p:grpSpPr>
-        <a:xfrm>
-          <a:off x="0" y="0"/>
-          <a:ext cx="0" cy="0"/>
-          <a:chOff x="0" y="0"/>
-          <a:chExt cx="0" cy="0"/>
-        </a:xfrm>
-      </p:grpSpPr>
-      <p:sp>
-        <p:nvSpPr>
-          <p:cNvPr id="3" name="Content Placeholder 2">
-            <a:extLst>
-              <a:ext uri="{FF2B5EF4-FFF2-40B4-BE49-F238E27FC236}">
-                <a16:creationId xmlns:a16="http://schemas.microsoft.com/office/drawing/2014/main" id="{CDDCD927-378E-DE44-9A03-85A12AF7F14D}"/>
-              </a:ext>
-            </a:extLst>
-          </p:cNvPr>
-          <p:cNvSpPr>
-            <a:spLocks noGrp="1"/>
-          </p:cNvSpPr>
-          <p:nvPr>
-            <p:ph idx="1"/>
-          </p:nvPr>
-        </p:nvSpPr>
-        <p:spPr/>
-        <p:txBody>
-          <a:bodyPr>
-            <a:normAutofit/>
-          </a:bodyPr>
-          <a:lstStyle/>
-          <a:p>
-            <a:pPr marL="0" indent="0">
-              <a:buNone/>
-            </a:pPr>
-            <a:r>
-              <a:rPr lang="en-US" sz="4000" dirty="0"/>
-              <a:t>End</a:t>
-            </a:r>
-          </a:p>
-        </p:txBody>
-      </p:sp>
-    </p:spTree>
-    <p:extLst>
-      <p:ext uri="{BB962C8B-B14F-4D97-AF65-F5344CB8AC3E}">
-        <p14:creationId xmlns:p14="http://schemas.microsoft.com/office/powerpoint/2010/main" val="3649488389"/>
-      </p:ext>
-    </p:extLst>
-  </p:cSld>
-  <p:clrMapOvr>
-    <a:masterClrMapping/>
-  </p:clrMapOvr>
-</p:sld>
-</file>
-
 <file path=ppt/slides/slide8.xml><?xml version="1.0" encoding="utf-8"?>
 <p:sld xmlns:a="http://schemas.openxmlformats.org/drawingml/2006/main" xmlns:r="http://schemas.openxmlformats.org/officeDocument/2006/relationships" xmlns:p="http://schemas.openxmlformats.org/presentationml/2006/main">
   <p:cSld>
@@ -8759,56 +8922,33 @@
       </p:grpSpPr>
       <p:sp>
         <p:nvSpPr>
-          <p:cNvPr id="4" name="Title 3">
-            <a:extLst>
-              <a:ext uri="{FF2B5EF4-FFF2-40B4-BE49-F238E27FC236}">
-                <a16:creationId xmlns:a16="http://schemas.microsoft.com/office/drawing/2014/main" id="{F34E2EAB-D6E1-BC4A-9819-9B4EEC845D4F}"/>
-              </a:ext>
-            </a:extLst>
-          </p:cNvPr>
-          <p:cNvSpPr>
-            <a:spLocks noGrp="1"/>
-          </p:cNvSpPr>
-          <p:nvPr>
-            <p:ph type="title"/>
-          </p:nvPr>
-        </p:nvSpPr>
-        <p:spPr/>
-        <p:txBody>
-          <a:bodyPr/>
-          <a:lstStyle/>
-          <a:p>
-            <a:r>
-              <a:rPr lang="en-US" dirty="0"/>
-              <a:t>Part 2</a:t>
-            </a:r>
-          </a:p>
-        </p:txBody>
-      </p:sp>
-      <p:sp>
-        <p:nvSpPr>
-          <p:cNvPr id="5" name="Text Placeholder 4">
-            <a:extLst>
-              <a:ext uri="{FF2B5EF4-FFF2-40B4-BE49-F238E27FC236}">
-                <a16:creationId xmlns:a16="http://schemas.microsoft.com/office/drawing/2014/main" id="{367BE044-68F9-0A48-98BB-68D2C2B72313}"/>
-              </a:ext>
-            </a:extLst>
-          </p:cNvPr>
-          <p:cNvSpPr>
-            <a:spLocks noGrp="1"/>
-          </p:cNvSpPr>
-          <p:nvPr>
-            <p:ph type="body" idx="1"/>
-          </p:nvPr>
-        </p:nvSpPr>
-        <p:spPr/>
-        <p:txBody>
-          <a:bodyPr/>
-          <a:lstStyle/>
-          <a:p>
-            <a:r>
-              <a:rPr lang="en-US" dirty="0"/>
-              <a:t>Data Access using Reactive SQL Client</a:t>
+          <p:cNvPr id="3" name="Content Placeholder 2">
+            <a:extLst>
+              <a:ext uri="{FF2B5EF4-FFF2-40B4-BE49-F238E27FC236}">
+                <a16:creationId xmlns:a16="http://schemas.microsoft.com/office/drawing/2014/main" id="{CDDCD927-378E-DE44-9A03-85A12AF7F14D}"/>
+              </a:ext>
+            </a:extLst>
+          </p:cNvPr>
+          <p:cNvSpPr>
+            <a:spLocks noGrp="1"/>
+          </p:cNvSpPr>
+          <p:nvPr>
+            <p:ph idx="1"/>
+          </p:nvPr>
+        </p:nvSpPr>
+        <p:spPr/>
+        <p:txBody>
+          <a:bodyPr>
+            <a:normAutofit/>
+          </a:bodyPr>
+          <a:lstStyle/>
+          <a:p>
+            <a:pPr marL="0" indent="0">
+              <a:buNone/>
+            </a:pPr>
+            <a:r>
+              <a:rPr lang="en-US" sz="4000" dirty="0"/>
+              <a:t>End</a:t>
             </a:r>
           </a:p>
         </p:txBody>
@@ -8816,7 +8956,7 @@
     </p:spTree>
     <p:extLst>
       <p:ext uri="{BB962C8B-B14F-4D97-AF65-F5344CB8AC3E}">
-        <p14:creationId xmlns:p14="http://schemas.microsoft.com/office/powerpoint/2010/main" val="2986313036"/>
+        <p14:creationId xmlns:p14="http://schemas.microsoft.com/office/powerpoint/2010/main" val="3649488389"/>
       </p:ext>
     </p:extLst>
   </p:cSld>
@@ -8845,10 +8985,10 @@
       </p:grpSpPr>
       <p:sp>
         <p:nvSpPr>
-          <p:cNvPr id="2" name="Title 1">
-            <a:extLst>
-              <a:ext uri="{FF2B5EF4-FFF2-40B4-BE49-F238E27FC236}">
-                <a16:creationId xmlns:a16="http://schemas.microsoft.com/office/drawing/2014/main" id="{7AF6BA41-4354-DE44-820F-886611B13F2A}"/>
+          <p:cNvPr id="4" name="Title 3">
+            <a:extLst>
+              <a:ext uri="{FF2B5EF4-FFF2-40B4-BE49-F238E27FC236}">
+                <a16:creationId xmlns:a16="http://schemas.microsoft.com/office/drawing/2014/main" id="{F34E2EAB-D6E1-BC4A-9819-9B4EEC845D4F}"/>
               </a:ext>
             </a:extLst>
           </p:cNvPr>
@@ -8866,59 +9006,35 @@
           <a:p>
             <a:r>
               <a:rPr lang="en-US" dirty="0"/>
-              <a:t>Agenda</a:t>
-            </a:r>
-          </a:p>
-        </p:txBody>
-      </p:sp>
-      <p:sp>
-        <p:nvSpPr>
-          <p:cNvPr id="3" name="Content Placeholder 2">
-            <a:extLst>
-              <a:ext uri="{FF2B5EF4-FFF2-40B4-BE49-F238E27FC236}">
-                <a16:creationId xmlns:a16="http://schemas.microsoft.com/office/drawing/2014/main" id="{F0290652-2C22-2744-9B94-94A613AB1001}"/>
-              </a:ext>
-            </a:extLst>
-          </p:cNvPr>
-          <p:cNvSpPr>
-            <a:spLocks noGrp="1"/>
-          </p:cNvSpPr>
-          <p:nvPr>
-            <p:ph idx="1"/>
-          </p:nvPr>
-        </p:nvSpPr>
-        <p:spPr/>
-        <p:txBody>
-          <a:bodyPr/>
-          <a:lstStyle/>
-          <a:p>
-            <a:r>
-              <a:rPr lang="en-US" dirty="0"/>
-              <a:t>Introduction to reactive SQL client</a:t>
-            </a:r>
-          </a:p>
-          <a:p>
-            <a:r>
-              <a:rPr lang="en-US" dirty="0"/>
-              <a:t>Reactive SQL Client Extensions</a:t>
-            </a:r>
-          </a:p>
-          <a:p>
-            <a:r>
-              <a:rPr lang="en-US" dirty="0"/>
-              <a:t>Configuring Reactive Datasource</a:t>
-            </a:r>
-          </a:p>
-          <a:p>
-            <a:r>
-              <a:rPr lang="en-US" dirty="0"/>
-              <a:t>Reading &amp; Writing Data – Reactive way</a:t>
-            </a:r>
-          </a:p>
-          <a:p>
-            <a:r>
-              <a:rPr lang="en-US" dirty="0"/>
-              <a:t>Handling Transactions </a:t>
+              <a:t>Part 2</a:t>
+            </a:r>
+          </a:p>
+        </p:txBody>
+      </p:sp>
+      <p:sp>
+        <p:nvSpPr>
+          <p:cNvPr id="5" name="Text Placeholder 4">
+            <a:extLst>
+              <a:ext uri="{FF2B5EF4-FFF2-40B4-BE49-F238E27FC236}">
+                <a16:creationId xmlns:a16="http://schemas.microsoft.com/office/drawing/2014/main" id="{367BE044-68F9-0A48-98BB-68D2C2B72313}"/>
+              </a:ext>
+            </a:extLst>
+          </p:cNvPr>
+          <p:cNvSpPr>
+            <a:spLocks noGrp="1"/>
+          </p:cNvSpPr>
+          <p:nvPr>
+            <p:ph type="body" idx="1"/>
+          </p:nvPr>
+        </p:nvSpPr>
+        <p:spPr/>
+        <p:txBody>
+          <a:bodyPr/>
+          <a:lstStyle/>
+          <a:p>
+            <a:r>
+              <a:rPr lang="en-US" dirty="0"/>
+              <a:t>Data Access using Reactive SQL Client</a:t>
             </a:r>
           </a:p>
         </p:txBody>
@@ -8926,7 +9042,7 @@
     </p:spTree>
     <p:extLst>
       <p:ext uri="{BB962C8B-B14F-4D97-AF65-F5344CB8AC3E}">
-        <p14:creationId xmlns:p14="http://schemas.microsoft.com/office/powerpoint/2010/main" val="782637085"/>
+        <p14:creationId xmlns:p14="http://schemas.microsoft.com/office/powerpoint/2010/main" val="2986313036"/>
       </p:ext>
     </p:extLst>
   </p:cSld>

</xml_diff>